<commit_message>
General updates and expansion
</commit_message>
<xml_diff>
--- a/Architecture/arm_introduction/ARM/NEON_intro.pptx
+++ b/Architecture/arm_introduction/ARM/NEON_intro.pptx
@@ -5,7 +5,7 @@
     <p:sldMasterId id="2147483660" r:id="rId1"/>
   </p:sldMasterIdLst>
   <p:notesMasterIdLst>
-    <p:notesMasterId r:id="rId13"/>
+    <p:notesMasterId r:id="rId17"/>
   </p:notesMasterIdLst>
   <p:sldIdLst>
     <p:sldId id="256" r:id="rId2"/>
@@ -15,10 +15,14 @@
     <p:sldId id="355" r:id="rId6"/>
     <p:sldId id="345" r:id="rId7"/>
     <p:sldId id="346" r:id="rId8"/>
-    <p:sldId id="354" r:id="rId9"/>
-    <p:sldId id="349" r:id="rId10"/>
-    <p:sldId id="350" r:id="rId11"/>
-    <p:sldId id="351" r:id="rId12"/>
+    <p:sldId id="357" r:id="rId9"/>
+    <p:sldId id="358" r:id="rId10"/>
+    <p:sldId id="359" r:id="rId11"/>
+    <p:sldId id="356" r:id="rId12"/>
+    <p:sldId id="354" r:id="rId13"/>
+    <p:sldId id="349" r:id="rId14"/>
+    <p:sldId id="350" r:id="rId15"/>
+    <p:sldId id="351" r:id="rId16"/>
   </p:sldIdLst>
   <p:sldSz cx="12192000" cy="6858000"/>
   <p:notesSz cx="6858000" cy="9144000"/>
@@ -207,7 +211,7 @@
           <a:p>
             <a:fld id="{260930CF-E1B1-E844-9903-DBA6F9AF788E}" type="datetimeFigureOut">
               <a:rPr lang="en-US" smtClean="0"/>
-              <a:t>7/16/21</a:t>
+              <a:t>7/22/21</a:t>
             </a:fld>
             <a:endParaRPr lang="en-US"/>
           </a:p>
@@ -4481,7 +4485,10 @@
           </a:bodyPr>
           <a:lstStyle/>
           <a:p>
-            <a:endParaRPr lang="en-US" altLang="en-US" sz="1600" dirty="0"/>
+            <a:r>
+              <a:rPr lang="en-US" altLang="en-US" sz="1600" dirty="0"/>
+              <a:t>(These slides assume the ARMv7 NEON Architecture)</a:t>
+            </a:r>
           </a:p>
         </p:txBody>
       </p:sp>
@@ -4550,6 +4557,1622 @@
           <p:cNvPr id="2" name="Title 1">
             <a:extLst>
               <a:ext uri="{FF2B5EF4-FFF2-40B4-BE49-F238E27FC236}">
+                <a16:creationId xmlns:a16="http://schemas.microsoft.com/office/drawing/2014/main" id="{35FD946A-F189-7A4F-92BB-FFD0D17BC78A}"/>
+              </a:ext>
+            </a:extLst>
+          </p:cNvPr>
+          <p:cNvSpPr>
+            <a:spLocks noGrp="1"/>
+          </p:cNvSpPr>
+          <p:nvPr>
+            <p:ph type="title"/>
+          </p:nvPr>
+        </p:nvSpPr>
+        <p:spPr/>
+        <p:txBody>
+          <a:bodyPr/>
+          <a:lstStyle/>
+          <a:p>
+            <a:r>
+              <a:rPr lang="en-US" dirty="0"/>
+              <a:t>ARM NEON data processing</a:t>
+            </a:r>
+          </a:p>
+        </p:txBody>
+      </p:sp>
+      <p:sp>
+        <p:nvSpPr>
+          <p:cNvPr id="3" name="Content Placeholder 2">
+            <a:extLst>
+              <a:ext uri="{FF2B5EF4-FFF2-40B4-BE49-F238E27FC236}">
+                <a16:creationId xmlns:a16="http://schemas.microsoft.com/office/drawing/2014/main" id="{E39201AB-6D25-CA4C-A296-E69EE5F74260}"/>
+              </a:ext>
+            </a:extLst>
+          </p:cNvPr>
+          <p:cNvSpPr>
+            <a:spLocks noGrp="1"/>
+          </p:cNvSpPr>
+          <p:nvPr>
+            <p:ph idx="1"/>
+          </p:nvPr>
+        </p:nvSpPr>
+        <p:spPr/>
+        <p:txBody>
+          <a:bodyPr/>
+          <a:lstStyle/>
+          <a:p>
+            <a:r>
+              <a:rPr lang="en-US" sz="1800" b="1" dirty="0">
+                <a:latin typeface="Courier New" panose="02070309020205020404" pitchFamily="49" charset="0"/>
+                <a:cs typeface="Courier New" panose="02070309020205020404" pitchFamily="49" charset="0"/>
+              </a:rPr>
+              <a:t>VSUB.U8 D0, D1, D2</a:t>
+            </a:r>
+          </a:p>
+          <a:p>
+            <a:pPr lvl="1"/>
+            <a:r>
+              <a:rPr lang="en-US" dirty="0"/>
+              <a:t>Each 64-bit D-register is being treated as 8 8-bit unsigned integers.  The subtraction will take place like this:</a:t>
+            </a:r>
+          </a:p>
+          <a:p>
+            <a:pPr lvl="1"/>
+            <a:endParaRPr lang="en-US" dirty="0"/>
+          </a:p>
+          <a:p>
+            <a:pPr marL="448056" lvl="1" indent="0">
+              <a:buNone/>
+            </a:pPr>
+            <a:endParaRPr lang="en-US" dirty="0"/>
+          </a:p>
+          <a:p>
+            <a:pPr lvl="1"/>
+            <a:endParaRPr lang="en-US" dirty="0"/>
+          </a:p>
+          <a:p>
+            <a:pPr marL="137160" indent="0">
+              <a:buNone/>
+            </a:pPr>
+            <a:endParaRPr lang="en-US" dirty="0"/>
+          </a:p>
+          <a:p>
+            <a:endParaRPr lang="en-US" dirty="0"/>
+          </a:p>
+        </p:txBody>
+      </p:sp>
+      <p:sp>
+        <p:nvSpPr>
+          <p:cNvPr id="4" name="Footer Placeholder 3">
+            <a:extLst>
+              <a:ext uri="{FF2B5EF4-FFF2-40B4-BE49-F238E27FC236}">
+                <a16:creationId xmlns:a16="http://schemas.microsoft.com/office/drawing/2014/main" id="{008E2A55-60B3-F647-BA43-63A59B36B6B1}"/>
+              </a:ext>
+            </a:extLst>
+          </p:cNvPr>
+          <p:cNvSpPr>
+            <a:spLocks noGrp="1"/>
+          </p:cNvSpPr>
+          <p:nvPr>
+            <p:ph type="ftr" sz="quarter" idx="11"/>
+          </p:nvPr>
+        </p:nvSpPr>
+        <p:spPr/>
+        <p:txBody>
+          <a:bodyPr/>
+          <a:lstStyle/>
+          <a:p>
+            <a:r>
+              <a:rPr lang="en-US"/>
+              <a:t>ToUCH Project</a:t>
+            </a:r>
+          </a:p>
+        </p:txBody>
+      </p:sp>
+      <p:sp>
+        <p:nvSpPr>
+          <p:cNvPr id="5" name="Slide Number Placeholder 4">
+            <a:extLst>
+              <a:ext uri="{FF2B5EF4-FFF2-40B4-BE49-F238E27FC236}">
+                <a16:creationId xmlns:a16="http://schemas.microsoft.com/office/drawing/2014/main" id="{1B33D5D7-426D-FB4B-AB1D-841DF37B3DFC}"/>
+              </a:ext>
+            </a:extLst>
+          </p:cNvPr>
+          <p:cNvSpPr>
+            <a:spLocks noGrp="1"/>
+          </p:cNvSpPr>
+          <p:nvPr>
+            <p:ph type="sldNum" sz="quarter" idx="12"/>
+          </p:nvPr>
+        </p:nvSpPr>
+        <p:spPr/>
+        <p:txBody>
+          <a:bodyPr/>
+          <a:lstStyle/>
+          <a:p>
+            <a:fld id="{1BD72A7C-CD32-D543-9541-5D4E9CD9F017}" type="slidenum">
+              <a:rPr lang="en-US" smtClean="0"/>
+              <a:t>10</a:t>
+            </a:fld>
+            <a:endParaRPr lang="en-US"/>
+          </a:p>
+        </p:txBody>
+      </p:sp>
+      <p:graphicFrame>
+        <p:nvGraphicFramePr>
+          <p:cNvPr id="6" name="Table 6">
+            <a:extLst>
+              <a:ext uri="{FF2B5EF4-FFF2-40B4-BE49-F238E27FC236}">
+                <a16:creationId xmlns:a16="http://schemas.microsoft.com/office/drawing/2014/main" id="{FFC0C618-BBDF-DF4E-88BE-E57FA32745A2}"/>
+              </a:ext>
+            </a:extLst>
+          </p:cNvPr>
+          <p:cNvGraphicFramePr>
+            <a:graphicFrameLocks noGrp="1"/>
+          </p:cNvGraphicFramePr>
+          <p:nvPr/>
+        </p:nvGraphicFramePr>
+        <p:xfrm>
+          <a:off x="2240344" y="2826259"/>
+          <a:ext cx="7112000" cy="1768890"/>
+        </p:xfrm>
+        <a:graphic>
+          <a:graphicData uri="http://schemas.openxmlformats.org/drawingml/2006/table">
+            <a:tbl>
+              <a:tblPr firstRow="1" bandRow="1">
+                <a:tableStyleId>{16D9F66E-5EB9-4882-86FB-DCBF35E3C3E4}</a:tableStyleId>
+              </a:tblPr>
+              <a:tblGrid>
+                <a:gridCol w="889000">
+                  <a:extLst>
+                    <a:ext uri="{9D8B030D-6E8A-4147-A177-3AD203B41FA5}">
+                      <a16:colId xmlns:a16="http://schemas.microsoft.com/office/drawing/2014/main" val="489603817"/>
+                    </a:ext>
+                  </a:extLst>
+                </a:gridCol>
+                <a:gridCol w="889000">
+                  <a:extLst>
+                    <a:ext uri="{9D8B030D-6E8A-4147-A177-3AD203B41FA5}">
+                      <a16:colId xmlns:a16="http://schemas.microsoft.com/office/drawing/2014/main" val="1447518166"/>
+                    </a:ext>
+                  </a:extLst>
+                </a:gridCol>
+                <a:gridCol w="889000">
+                  <a:extLst>
+                    <a:ext uri="{9D8B030D-6E8A-4147-A177-3AD203B41FA5}">
+                      <a16:colId xmlns:a16="http://schemas.microsoft.com/office/drawing/2014/main" val="1949260619"/>
+                    </a:ext>
+                  </a:extLst>
+                </a:gridCol>
+                <a:gridCol w="889000">
+                  <a:extLst>
+                    <a:ext uri="{9D8B030D-6E8A-4147-A177-3AD203B41FA5}">
+                      <a16:colId xmlns:a16="http://schemas.microsoft.com/office/drawing/2014/main" val="3294147728"/>
+                    </a:ext>
+                  </a:extLst>
+                </a:gridCol>
+                <a:gridCol w="889000">
+                  <a:extLst>
+                    <a:ext uri="{9D8B030D-6E8A-4147-A177-3AD203B41FA5}">
+                      <a16:colId xmlns:a16="http://schemas.microsoft.com/office/drawing/2014/main" val="3298937190"/>
+                    </a:ext>
+                  </a:extLst>
+                </a:gridCol>
+                <a:gridCol w="889000">
+                  <a:extLst>
+                    <a:ext uri="{9D8B030D-6E8A-4147-A177-3AD203B41FA5}">
+                      <a16:colId xmlns:a16="http://schemas.microsoft.com/office/drawing/2014/main" val="3598892603"/>
+                    </a:ext>
+                  </a:extLst>
+                </a:gridCol>
+                <a:gridCol w="889000">
+                  <a:extLst>
+                    <a:ext uri="{9D8B030D-6E8A-4147-A177-3AD203B41FA5}">
+                      <a16:colId xmlns:a16="http://schemas.microsoft.com/office/drawing/2014/main" val="558931131"/>
+                    </a:ext>
+                  </a:extLst>
+                </a:gridCol>
+                <a:gridCol w="889000">
+                  <a:extLst>
+                    <a:ext uri="{9D8B030D-6E8A-4147-A177-3AD203B41FA5}">
+                      <a16:colId xmlns:a16="http://schemas.microsoft.com/office/drawing/2014/main" val="379065270"/>
+                    </a:ext>
+                  </a:extLst>
+                </a:gridCol>
+              </a:tblGrid>
+              <a:tr h="353778">
+                <a:tc>
+                  <a:txBody>
+                    <a:bodyPr/>
+                    <a:lstStyle/>
+                    <a:p>
+                      <a:pPr algn="ctr"/>
+                      <a:r>
+                        <a:rPr lang="en-US" sz="1600" b="1" dirty="0">
+                          <a:latin typeface="Courier New" panose="02070309020205020404" pitchFamily="49" charset="0"/>
+                          <a:cs typeface="Courier New" panose="02070309020205020404" pitchFamily="49" charset="0"/>
+                        </a:rPr>
+                        <a:t>D1[0]</a:t>
+                      </a:r>
+                    </a:p>
+                  </a:txBody>
+                  <a:tcPr/>
+                </a:tc>
+                <a:tc>
+                  <a:txBody>
+                    <a:bodyPr/>
+                    <a:lstStyle/>
+                    <a:p>
+                      <a:pPr algn="ctr"/>
+                      <a:r>
+                        <a:rPr lang="en-US" sz="1600" b="1" dirty="0">
+                          <a:latin typeface="Courier New" panose="02070309020205020404" pitchFamily="49" charset="0"/>
+                          <a:cs typeface="Courier New" panose="02070309020205020404" pitchFamily="49" charset="0"/>
+                        </a:rPr>
+                        <a:t>D1[1]</a:t>
+                      </a:r>
+                    </a:p>
+                  </a:txBody>
+                  <a:tcPr/>
+                </a:tc>
+                <a:tc>
+                  <a:txBody>
+                    <a:bodyPr/>
+                    <a:lstStyle/>
+                    <a:p>
+                      <a:pPr algn="ctr"/>
+                      <a:r>
+                        <a:rPr lang="en-US" sz="1600" b="1" dirty="0">
+                          <a:latin typeface="Courier New" panose="02070309020205020404" pitchFamily="49" charset="0"/>
+                          <a:cs typeface="Courier New" panose="02070309020205020404" pitchFamily="49" charset="0"/>
+                        </a:rPr>
+                        <a:t>D1[2]</a:t>
+                      </a:r>
+                    </a:p>
+                  </a:txBody>
+                  <a:tcPr/>
+                </a:tc>
+                <a:tc>
+                  <a:txBody>
+                    <a:bodyPr/>
+                    <a:lstStyle/>
+                    <a:p>
+                      <a:pPr algn="ctr"/>
+                      <a:r>
+                        <a:rPr lang="en-US" sz="1600" b="1" dirty="0">
+                          <a:latin typeface="Courier New" panose="02070309020205020404" pitchFamily="49" charset="0"/>
+                          <a:cs typeface="Courier New" panose="02070309020205020404" pitchFamily="49" charset="0"/>
+                        </a:rPr>
+                        <a:t>D1[3]</a:t>
+                      </a:r>
+                    </a:p>
+                  </a:txBody>
+                  <a:tcPr/>
+                </a:tc>
+                <a:tc>
+                  <a:txBody>
+                    <a:bodyPr/>
+                    <a:lstStyle/>
+                    <a:p>
+                      <a:pPr algn="ctr"/>
+                      <a:r>
+                        <a:rPr lang="en-US" sz="1600" b="1" dirty="0">
+                          <a:latin typeface="Courier New" panose="02070309020205020404" pitchFamily="49" charset="0"/>
+                          <a:cs typeface="Courier New" panose="02070309020205020404" pitchFamily="49" charset="0"/>
+                        </a:rPr>
+                        <a:t>D1[4]</a:t>
+                      </a:r>
+                    </a:p>
+                  </a:txBody>
+                  <a:tcPr/>
+                </a:tc>
+                <a:tc>
+                  <a:txBody>
+                    <a:bodyPr/>
+                    <a:lstStyle/>
+                    <a:p>
+                      <a:pPr algn="ctr"/>
+                      <a:r>
+                        <a:rPr lang="en-US" sz="1600" b="1" dirty="0">
+                          <a:latin typeface="Courier New" panose="02070309020205020404" pitchFamily="49" charset="0"/>
+                          <a:cs typeface="Courier New" panose="02070309020205020404" pitchFamily="49" charset="0"/>
+                        </a:rPr>
+                        <a:t>D1[5]</a:t>
+                      </a:r>
+                    </a:p>
+                  </a:txBody>
+                  <a:tcPr/>
+                </a:tc>
+                <a:tc>
+                  <a:txBody>
+                    <a:bodyPr/>
+                    <a:lstStyle/>
+                    <a:p>
+                      <a:pPr algn="ctr"/>
+                      <a:r>
+                        <a:rPr lang="en-US" sz="1600" b="1" dirty="0">
+                          <a:latin typeface="Courier New" panose="02070309020205020404" pitchFamily="49" charset="0"/>
+                          <a:cs typeface="Courier New" panose="02070309020205020404" pitchFamily="49" charset="0"/>
+                        </a:rPr>
+                        <a:t>D1[6]</a:t>
+                      </a:r>
+                    </a:p>
+                  </a:txBody>
+                  <a:tcPr/>
+                </a:tc>
+                <a:tc>
+                  <a:txBody>
+                    <a:bodyPr/>
+                    <a:lstStyle/>
+                    <a:p>
+                      <a:pPr algn="ctr"/>
+                      <a:r>
+                        <a:rPr lang="en-US" sz="1600" b="1" dirty="0">
+                          <a:latin typeface="Courier New" panose="02070309020205020404" pitchFamily="49" charset="0"/>
+                          <a:cs typeface="Courier New" panose="02070309020205020404" pitchFamily="49" charset="0"/>
+                        </a:rPr>
+                        <a:t>D1[7]</a:t>
+                      </a:r>
+                    </a:p>
+                  </a:txBody>
+                  <a:tcPr/>
+                </a:tc>
+                <a:extLst>
+                  <a:ext uri="{0D108BD9-81ED-4DB2-BD59-A6C34878D82A}">
+                    <a16:rowId xmlns:a16="http://schemas.microsoft.com/office/drawing/2014/main" val="1296216866"/>
+                  </a:ext>
+                </a:extLst>
+              </a:tr>
+              <a:tr h="353778">
+                <a:tc>
+                  <a:txBody>
+                    <a:bodyPr/>
+                    <a:lstStyle/>
+                    <a:p>
+                      <a:pPr algn="ctr"/>
+                      <a:r>
+                        <a:rPr lang="en-US" sz="1600" b="1" dirty="0">
+                          <a:latin typeface="Courier New" panose="02070309020205020404" pitchFamily="49" charset="0"/>
+                          <a:cs typeface="Courier New" panose="02070309020205020404" pitchFamily="49" charset="0"/>
+                        </a:rPr>
+                        <a:t>–</a:t>
+                      </a:r>
+                    </a:p>
+                  </a:txBody>
+                  <a:tcPr/>
+                </a:tc>
+                <a:tc>
+                  <a:txBody>
+                    <a:bodyPr/>
+                    <a:lstStyle/>
+                    <a:p>
+                      <a:pPr algn="ctr"/>
+                      <a:r>
+                        <a:rPr lang="en-US" sz="1600" b="1" dirty="0">
+                          <a:latin typeface="Courier New" panose="02070309020205020404" pitchFamily="49" charset="0"/>
+                          <a:cs typeface="Courier New" panose="02070309020205020404" pitchFamily="49" charset="0"/>
+                        </a:rPr>
+                        <a:t>–</a:t>
+                      </a:r>
+                    </a:p>
+                  </a:txBody>
+                  <a:tcPr/>
+                </a:tc>
+                <a:tc>
+                  <a:txBody>
+                    <a:bodyPr/>
+                    <a:lstStyle/>
+                    <a:p>
+                      <a:pPr algn="ctr"/>
+                      <a:r>
+                        <a:rPr lang="en-US" sz="1600" b="1" dirty="0">
+                          <a:latin typeface="Courier New" panose="02070309020205020404" pitchFamily="49" charset="0"/>
+                          <a:cs typeface="Courier New" panose="02070309020205020404" pitchFamily="49" charset="0"/>
+                        </a:rPr>
+                        <a:t>–</a:t>
+                      </a:r>
+                    </a:p>
+                  </a:txBody>
+                  <a:tcPr/>
+                </a:tc>
+                <a:tc>
+                  <a:txBody>
+                    <a:bodyPr/>
+                    <a:lstStyle/>
+                    <a:p>
+                      <a:pPr algn="ctr"/>
+                      <a:r>
+                        <a:rPr lang="en-US" sz="1600" b="1" dirty="0">
+                          <a:latin typeface="Courier New" panose="02070309020205020404" pitchFamily="49" charset="0"/>
+                          <a:cs typeface="Courier New" panose="02070309020205020404" pitchFamily="49" charset="0"/>
+                        </a:rPr>
+                        <a:t>–</a:t>
+                      </a:r>
+                    </a:p>
+                  </a:txBody>
+                  <a:tcPr/>
+                </a:tc>
+                <a:tc>
+                  <a:txBody>
+                    <a:bodyPr/>
+                    <a:lstStyle/>
+                    <a:p>
+                      <a:pPr algn="ctr"/>
+                      <a:r>
+                        <a:rPr lang="en-US" sz="1600" b="1" dirty="0">
+                          <a:latin typeface="Courier New" panose="02070309020205020404" pitchFamily="49" charset="0"/>
+                          <a:cs typeface="Courier New" panose="02070309020205020404" pitchFamily="49" charset="0"/>
+                        </a:rPr>
+                        <a:t>–</a:t>
+                      </a:r>
+                    </a:p>
+                  </a:txBody>
+                  <a:tcPr/>
+                </a:tc>
+                <a:tc>
+                  <a:txBody>
+                    <a:bodyPr/>
+                    <a:lstStyle/>
+                    <a:p>
+                      <a:pPr algn="ctr"/>
+                      <a:r>
+                        <a:rPr lang="en-US" sz="1600" b="1" dirty="0">
+                          <a:latin typeface="Courier New" panose="02070309020205020404" pitchFamily="49" charset="0"/>
+                          <a:cs typeface="Courier New" panose="02070309020205020404" pitchFamily="49" charset="0"/>
+                        </a:rPr>
+                        <a:t>–</a:t>
+                      </a:r>
+                    </a:p>
+                  </a:txBody>
+                  <a:tcPr/>
+                </a:tc>
+                <a:tc>
+                  <a:txBody>
+                    <a:bodyPr/>
+                    <a:lstStyle/>
+                    <a:p>
+                      <a:pPr algn="ctr"/>
+                      <a:r>
+                        <a:rPr lang="en-US" sz="1600" b="1" dirty="0">
+                          <a:latin typeface="Courier New" panose="02070309020205020404" pitchFamily="49" charset="0"/>
+                          <a:cs typeface="Courier New" panose="02070309020205020404" pitchFamily="49" charset="0"/>
+                        </a:rPr>
+                        <a:t>–</a:t>
+                      </a:r>
+                    </a:p>
+                  </a:txBody>
+                  <a:tcPr/>
+                </a:tc>
+                <a:tc>
+                  <a:txBody>
+                    <a:bodyPr/>
+                    <a:lstStyle/>
+                    <a:p>
+                      <a:pPr algn="ctr"/>
+                      <a:r>
+                        <a:rPr lang="en-US" sz="1600" b="1" dirty="0">
+                          <a:latin typeface="Courier New" panose="02070309020205020404" pitchFamily="49" charset="0"/>
+                          <a:cs typeface="Courier New" panose="02070309020205020404" pitchFamily="49" charset="0"/>
+                        </a:rPr>
+                        <a:t>–</a:t>
+                      </a:r>
+                    </a:p>
+                  </a:txBody>
+                  <a:tcPr/>
+                </a:tc>
+                <a:extLst>
+                  <a:ext uri="{0D108BD9-81ED-4DB2-BD59-A6C34878D82A}">
+                    <a16:rowId xmlns:a16="http://schemas.microsoft.com/office/drawing/2014/main" val="3989560634"/>
+                  </a:ext>
+                </a:extLst>
+              </a:tr>
+              <a:tr h="353778">
+                <a:tc>
+                  <a:txBody>
+                    <a:bodyPr/>
+                    <a:lstStyle/>
+                    <a:p>
+                      <a:pPr algn="ctr"/>
+                      <a:r>
+                        <a:rPr lang="en-US" sz="1600" b="1" dirty="0">
+                          <a:latin typeface="Courier New" panose="02070309020205020404" pitchFamily="49" charset="0"/>
+                          <a:cs typeface="Courier New" panose="02070309020205020404" pitchFamily="49" charset="0"/>
+                        </a:rPr>
+                        <a:t>D2[0]</a:t>
+                      </a:r>
+                    </a:p>
+                  </a:txBody>
+                  <a:tcPr/>
+                </a:tc>
+                <a:tc>
+                  <a:txBody>
+                    <a:bodyPr/>
+                    <a:lstStyle/>
+                    <a:p>
+                      <a:pPr algn="ctr"/>
+                      <a:r>
+                        <a:rPr lang="en-US" sz="1600" b="1" dirty="0">
+                          <a:latin typeface="Courier New" panose="02070309020205020404" pitchFamily="49" charset="0"/>
+                          <a:cs typeface="Courier New" panose="02070309020205020404" pitchFamily="49" charset="0"/>
+                        </a:rPr>
+                        <a:t>D2[1]</a:t>
+                      </a:r>
+                    </a:p>
+                  </a:txBody>
+                  <a:tcPr/>
+                </a:tc>
+                <a:tc>
+                  <a:txBody>
+                    <a:bodyPr/>
+                    <a:lstStyle/>
+                    <a:p>
+                      <a:pPr algn="ctr"/>
+                      <a:r>
+                        <a:rPr lang="en-US" sz="1600" b="1" dirty="0">
+                          <a:latin typeface="Courier New" panose="02070309020205020404" pitchFamily="49" charset="0"/>
+                          <a:cs typeface="Courier New" panose="02070309020205020404" pitchFamily="49" charset="0"/>
+                        </a:rPr>
+                        <a:t>D2[2]</a:t>
+                      </a:r>
+                    </a:p>
+                  </a:txBody>
+                  <a:tcPr/>
+                </a:tc>
+                <a:tc>
+                  <a:txBody>
+                    <a:bodyPr/>
+                    <a:lstStyle/>
+                    <a:p>
+                      <a:pPr algn="ctr"/>
+                      <a:r>
+                        <a:rPr lang="en-US" sz="1600" b="1" dirty="0">
+                          <a:latin typeface="Courier New" panose="02070309020205020404" pitchFamily="49" charset="0"/>
+                          <a:cs typeface="Courier New" panose="02070309020205020404" pitchFamily="49" charset="0"/>
+                        </a:rPr>
+                        <a:t>D2[3]</a:t>
+                      </a:r>
+                    </a:p>
+                  </a:txBody>
+                  <a:tcPr/>
+                </a:tc>
+                <a:tc>
+                  <a:txBody>
+                    <a:bodyPr/>
+                    <a:lstStyle/>
+                    <a:p>
+                      <a:pPr algn="ctr"/>
+                      <a:r>
+                        <a:rPr lang="en-US" sz="1600" b="1" dirty="0">
+                          <a:latin typeface="Courier New" panose="02070309020205020404" pitchFamily="49" charset="0"/>
+                          <a:cs typeface="Courier New" panose="02070309020205020404" pitchFamily="49" charset="0"/>
+                        </a:rPr>
+                        <a:t>D2[4]</a:t>
+                      </a:r>
+                    </a:p>
+                  </a:txBody>
+                  <a:tcPr/>
+                </a:tc>
+                <a:tc>
+                  <a:txBody>
+                    <a:bodyPr/>
+                    <a:lstStyle/>
+                    <a:p>
+                      <a:pPr algn="ctr"/>
+                      <a:r>
+                        <a:rPr lang="en-US" sz="1600" b="1" dirty="0">
+                          <a:latin typeface="Courier New" panose="02070309020205020404" pitchFamily="49" charset="0"/>
+                          <a:cs typeface="Courier New" panose="02070309020205020404" pitchFamily="49" charset="0"/>
+                        </a:rPr>
+                        <a:t>D2[5]</a:t>
+                      </a:r>
+                    </a:p>
+                  </a:txBody>
+                  <a:tcPr/>
+                </a:tc>
+                <a:tc>
+                  <a:txBody>
+                    <a:bodyPr/>
+                    <a:lstStyle/>
+                    <a:p>
+                      <a:pPr algn="ctr"/>
+                      <a:r>
+                        <a:rPr lang="en-US" sz="1600" b="1" dirty="0">
+                          <a:latin typeface="Courier New" panose="02070309020205020404" pitchFamily="49" charset="0"/>
+                          <a:cs typeface="Courier New" panose="02070309020205020404" pitchFamily="49" charset="0"/>
+                        </a:rPr>
+                        <a:t>D2[6]</a:t>
+                      </a:r>
+                    </a:p>
+                  </a:txBody>
+                  <a:tcPr/>
+                </a:tc>
+                <a:tc>
+                  <a:txBody>
+                    <a:bodyPr/>
+                    <a:lstStyle/>
+                    <a:p>
+                      <a:pPr algn="ctr"/>
+                      <a:r>
+                        <a:rPr lang="en-US" sz="1600" b="1" dirty="0">
+                          <a:latin typeface="Courier New" panose="02070309020205020404" pitchFamily="49" charset="0"/>
+                          <a:cs typeface="Courier New" panose="02070309020205020404" pitchFamily="49" charset="0"/>
+                        </a:rPr>
+                        <a:t>D2[7]</a:t>
+                      </a:r>
+                    </a:p>
+                  </a:txBody>
+                  <a:tcPr/>
+                </a:tc>
+                <a:extLst>
+                  <a:ext uri="{0D108BD9-81ED-4DB2-BD59-A6C34878D82A}">
+                    <a16:rowId xmlns:a16="http://schemas.microsoft.com/office/drawing/2014/main" val="1353812191"/>
+                  </a:ext>
+                </a:extLst>
+              </a:tr>
+              <a:tr h="353778">
+                <a:tc>
+                  <a:txBody>
+                    <a:bodyPr/>
+                    <a:lstStyle/>
+                    <a:p>
+                      <a:pPr algn="ctr"/>
+                      <a:r>
+                        <a:rPr lang="en-US" sz="1600" b="1" dirty="0">
+                          <a:latin typeface="Courier New" panose="02070309020205020404" pitchFamily="49" charset="0"/>
+                          <a:cs typeface="Courier New" panose="02070309020205020404" pitchFamily="49" charset="0"/>
+                        </a:rPr>
+                        <a:t>↓</a:t>
+                      </a:r>
+                    </a:p>
+                  </a:txBody>
+                  <a:tcPr/>
+                </a:tc>
+                <a:tc>
+                  <a:txBody>
+                    <a:bodyPr/>
+                    <a:lstStyle/>
+                    <a:p>
+                      <a:pPr algn="ctr"/>
+                      <a:r>
+                        <a:rPr lang="en-US" sz="1600" b="1" dirty="0">
+                          <a:latin typeface="Courier New" panose="02070309020205020404" pitchFamily="49" charset="0"/>
+                          <a:cs typeface="Courier New" panose="02070309020205020404" pitchFamily="49" charset="0"/>
+                        </a:rPr>
+                        <a:t>↓</a:t>
+                      </a:r>
+                    </a:p>
+                  </a:txBody>
+                  <a:tcPr/>
+                </a:tc>
+                <a:tc>
+                  <a:txBody>
+                    <a:bodyPr/>
+                    <a:lstStyle/>
+                    <a:p>
+                      <a:pPr marL="0" marR="0" lvl="0" indent="0" algn="ctr" defTabSz="914400" rtl="0" eaLnBrk="1" fontAlgn="auto" latinLnBrk="0" hangingPunct="1">
+                        <a:lnSpc>
+                          <a:spcPct val="100000"/>
+                        </a:lnSpc>
+                        <a:spcBef>
+                          <a:spcPts val="0"/>
+                        </a:spcBef>
+                        <a:spcAft>
+                          <a:spcPts val="0"/>
+                        </a:spcAft>
+                        <a:buClrTx/>
+                        <a:buSzTx/>
+                        <a:buFontTx/>
+                        <a:buNone/>
+                        <a:tabLst/>
+                        <a:defRPr/>
+                      </a:pPr>
+                      <a:r>
+                        <a:rPr lang="en-US" sz="1600" b="1" dirty="0">
+                          <a:latin typeface="Courier New" panose="02070309020205020404" pitchFamily="49" charset="0"/>
+                          <a:cs typeface="Courier New" panose="02070309020205020404" pitchFamily="49" charset="0"/>
+                        </a:rPr>
+                        <a:t>↓</a:t>
+                      </a:r>
+                    </a:p>
+                  </a:txBody>
+                  <a:tcPr/>
+                </a:tc>
+                <a:tc>
+                  <a:txBody>
+                    <a:bodyPr/>
+                    <a:lstStyle/>
+                    <a:p>
+                      <a:pPr marL="0" marR="0" lvl="0" indent="0" algn="ctr" defTabSz="914400" rtl="0" eaLnBrk="1" fontAlgn="auto" latinLnBrk="0" hangingPunct="1">
+                        <a:lnSpc>
+                          <a:spcPct val="100000"/>
+                        </a:lnSpc>
+                        <a:spcBef>
+                          <a:spcPts val="0"/>
+                        </a:spcBef>
+                        <a:spcAft>
+                          <a:spcPts val="0"/>
+                        </a:spcAft>
+                        <a:buClrTx/>
+                        <a:buSzTx/>
+                        <a:buFontTx/>
+                        <a:buNone/>
+                        <a:tabLst/>
+                        <a:defRPr/>
+                      </a:pPr>
+                      <a:r>
+                        <a:rPr lang="en-US" sz="1600" b="1" dirty="0">
+                          <a:latin typeface="Courier New" panose="02070309020205020404" pitchFamily="49" charset="0"/>
+                          <a:cs typeface="Courier New" panose="02070309020205020404" pitchFamily="49" charset="0"/>
+                        </a:rPr>
+                        <a:t>↓</a:t>
+                      </a:r>
+                    </a:p>
+                  </a:txBody>
+                  <a:tcPr/>
+                </a:tc>
+                <a:tc>
+                  <a:txBody>
+                    <a:bodyPr/>
+                    <a:lstStyle/>
+                    <a:p>
+                      <a:pPr marL="0" marR="0" lvl="0" indent="0" algn="ctr" defTabSz="914400" rtl="0" eaLnBrk="1" fontAlgn="auto" latinLnBrk="0" hangingPunct="1">
+                        <a:lnSpc>
+                          <a:spcPct val="100000"/>
+                        </a:lnSpc>
+                        <a:spcBef>
+                          <a:spcPts val="0"/>
+                        </a:spcBef>
+                        <a:spcAft>
+                          <a:spcPts val="0"/>
+                        </a:spcAft>
+                        <a:buClrTx/>
+                        <a:buSzTx/>
+                        <a:buFontTx/>
+                        <a:buNone/>
+                        <a:tabLst/>
+                        <a:defRPr/>
+                      </a:pPr>
+                      <a:r>
+                        <a:rPr lang="en-US" sz="1600" b="1" dirty="0">
+                          <a:latin typeface="Courier New" panose="02070309020205020404" pitchFamily="49" charset="0"/>
+                          <a:cs typeface="Courier New" panose="02070309020205020404" pitchFamily="49" charset="0"/>
+                        </a:rPr>
+                        <a:t>↓</a:t>
+                      </a:r>
+                    </a:p>
+                  </a:txBody>
+                  <a:tcPr/>
+                </a:tc>
+                <a:tc>
+                  <a:txBody>
+                    <a:bodyPr/>
+                    <a:lstStyle/>
+                    <a:p>
+                      <a:pPr marL="0" marR="0" lvl="0" indent="0" algn="ctr" defTabSz="914400" rtl="0" eaLnBrk="1" fontAlgn="auto" latinLnBrk="0" hangingPunct="1">
+                        <a:lnSpc>
+                          <a:spcPct val="100000"/>
+                        </a:lnSpc>
+                        <a:spcBef>
+                          <a:spcPts val="0"/>
+                        </a:spcBef>
+                        <a:spcAft>
+                          <a:spcPts val="0"/>
+                        </a:spcAft>
+                        <a:buClrTx/>
+                        <a:buSzTx/>
+                        <a:buFontTx/>
+                        <a:buNone/>
+                        <a:tabLst/>
+                        <a:defRPr/>
+                      </a:pPr>
+                      <a:r>
+                        <a:rPr lang="en-US" sz="1600" b="1" dirty="0">
+                          <a:latin typeface="Courier New" panose="02070309020205020404" pitchFamily="49" charset="0"/>
+                          <a:cs typeface="Courier New" panose="02070309020205020404" pitchFamily="49" charset="0"/>
+                        </a:rPr>
+                        <a:t>↓</a:t>
+                      </a:r>
+                    </a:p>
+                  </a:txBody>
+                  <a:tcPr/>
+                </a:tc>
+                <a:tc>
+                  <a:txBody>
+                    <a:bodyPr/>
+                    <a:lstStyle/>
+                    <a:p>
+                      <a:pPr marL="0" marR="0" lvl="0" indent="0" algn="ctr" defTabSz="914400" rtl="0" eaLnBrk="1" fontAlgn="auto" latinLnBrk="0" hangingPunct="1">
+                        <a:lnSpc>
+                          <a:spcPct val="100000"/>
+                        </a:lnSpc>
+                        <a:spcBef>
+                          <a:spcPts val="0"/>
+                        </a:spcBef>
+                        <a:spcAft>
+                          <a:spcPts val="0"/>
+                        </a:spcAft>
+                        <a:buClrTx/>
+                        <a:buSzTx/>
+                        <a:buFontTx/>
+                        <a:buNone/>
+                        <a:tabLst/>
+                        <a:defRPr/>
+                      </a:pPr>
+                      <a:r>
+                        <a:rPr lang="en-US" sz="1600" b="1" dirty="0">
+                          <a:latin typeface="Courier New" panose="02070309020205020404" pitchFamily="49" charset="0"/>
+                          <a:cs typeface="Courier New" panose="02070309020205020404" pitchFamily="49" charset="0"/>
+                        </a:rPr>
+                        <a:t>↓</a:t>
+                      </a:r>
+                    </a:p>
+                  </a:txBody>
+                  <a:tcPr/>
+                </a:tc>
+                <a:tc>
+                  <a:txBody>
+                    <a:bodyPr/>
+                    <a:lstStyle/>
+                    <a:p>
+                      <a:pPr marL="0" marR="0" lvl="0" indent="0" algn="ctr" defTabSz="914400" rtl="0" eaLnBrk="1" fontAlgn="auto" latinLnBrk="0" hangingPunct="1">
+                        <a:lnSpc>
+                          <a:spcPct val="100000"/>
+                        </a:lnSpc>
+                        <a:spcBef>
+                          <a:spcPts val="0"/>
+                        </a:spcBef>
+                        <a:spcAft>
+                          <a:spcPts val="0"/>
+                        </a:spcAft>
+                        <a:buClrTx/>
+                        <a:buSzTx/>
+                        <a:buFontTx/>
+                        <a:buNone/>
+                        <a:tabLst/>
+                        <a:defRPr/>
+                      </a:pPr>
+                      <a:r>
+                        <a:rPr lang="en-US" sz="1600" b="1" dirty="0">
+                          <a:latin typeface="Courier New" panose="02070309020205020404" pitchFamily="49" charset="0"/>
+                          <a:cs typeface="Courier New" panose="02070309020205020404" pitchFamily="49" charset="0"/>
+                        </a:rPr>
+                        <a:t>↓</a:t>
+                      </a:r>
+                    </a:p>
+                  </a:txBody>
+                  <a:tcPr/>
+                </a:tc>
+                <a:extLst>
+                  <a:ext uri="{0D108BD9-81ED-4DB2-BD59-A6C34878D82A}">
+                    <a16:rowId xmlns:a16="http://schemas.microsoft.com/office/drawing/2014/main" val="3906466838"/>
+                  </a:ext>
+                </a:extLst>
+              </a:tr>
+              <a:tr h="353778">
+                <a:tc>
+                  <a:txBody>
+                    <a:bodyPr/>
+                    <a:lstStyle/>
+                    <a:p>
+                      <a:pPr algn="ctr"/>
+                      <a:r>
+                        <a:rPr lang="en-US" sz="1600" b="1" dirty="0">
+                          <a:latin typeface="Courier New" panose="02070309020205020404" pitchFamily="49" charset="0"/>
+                          <a:cs typeface="Courier New" panose="02070309020205020404" pitchFamily="49" charset="0"/>
+                        </a:rPr>
+                        <a:t>D0[0]</a:t>
+                      </a:r>
+                    </a:p>
+                  </a:txBody>
+                  <a:tcPr/>
+                </a:tc>
+                <a:tc>
+                  <a:txBody>
+                    <a:bodyPr/>
+                    <a:lstStyle/>
+                    <a:p>
+                      <a:pPr algn="ctr"/>
+                      <a:r>
+                        <a:rPr lang="en-US" sz="1600" b="1" dirty="0">
+                          <a:latin typeface="Courier New" panose="02070309020205020404" pitchFamily="49" charset="0"/>
+                          <a:cs typeface="Courier New" panose="02070309020205020404" pitchFamily="49" charset="0"/>
+                        </a:rPr>
+                        <a:t>D0[1]</a:t>
+                      </a:r>
+                    </a:p>
+                  </a:txBody>
+                  <a:tcPr/>
+                </a:tc>
+                <a:tc>
+                  <a:txBody>
+                    <a:bodyPr/>
+                    <a:lstStyle/>
+                    <a:p>
+                      <a:pPr algn="ctr"/>
+                      <a:r>
+                        <a:rPr lang="en-US" sz="1600" b="1" dirty="0">
+                          <a:latin typeface="Courier New" panose="02070309020205020404" pitchFamily="49" charset="0"/>
+                          <a:cs typeface="Courier New" panose="02070309020205020404" pitchFamily="49" charset="0"/>
+                        </a:rPr>
+                        <a:t>D0[2]</a:t>
+                      </a:r>
+                    </a:p>
+                  </a:txBody>
+                  <a:tcPr/>
+                </a:tc>
+                <a:tc>
+                  <a:txBody>
+                    <a:bodyPr/>
+                    <a:lstStyle/>
+                    <a:p>
+                      <a:pPr algn="ctr"/>
+                      <a:r>
+                        <a:rPr lang="en-US" sz="1600" b="1" dirty="0">
+                          <a:latin typeface="Courier New" panose="02070309020205020404" pitchFamily="49" charset="0"/>
+                          <a:cs typeface="Courier New" panose="02070309020205020404" pitchFamily="49" charset="0"/>
+                        </a:rPr>
+                        <a:t>D0[3]</a:t>
+                      </a:r>
+                    </a:p>
+                  </a:txBody>
+                  <a:tcPr/>
+                </a:tc>
+                <a:tc>
+                  <a:txBody>
+                    <a:bodyPr/>
+                    <a:lstStyle/>
+                    <a:p>
+                      <a:pPr algn="ctr"/>
+                      <a:r>
+                        <a:rPr lang="en-US" sz="1600" b="1" dirty="0">
+                          <a:latin typeface="Courier New" panose="02070309020205020404" pitchFamily="49" charset="0"/>
+                          <a:cs typeface="Courier New" panose="02070309020205020404" pitchFamily="49" charset="0"/>
+                        </a:rPr>
+                        <a:t>D0[4]</a:t>
+                      </a:r>
+                    </a:p>
+                  </a:txBody>
+                  <a:tcPr/>
+                </a:tc>
+                <a:tc>
+                  <a:txBody>
+                    <a:bodyPr/>
+                    <a:lstStyle/>
+                    <a:p>
+                      <a:pPr algn="ctr"/>
+                      <a:r>
+                        <a:rPr lang="en-US" sz="1600" b="1" dirty="0">
+                          <a:latin typeface="Courier New" panose="02070309020205020404" pitchFamily="49" charset="0"/>
+                          <a:cs typeface="Courier New" panose="02070309020205020404" pitchFamily="49" charset="0"/>
+                        </a:rPr>
+                        <a:t>D0[5]</a:t>
+                      </a:r>
+                    </a:p>
+                  </a:txBody>
+                  <a:tcPr/>
+                </a:tc>
+                <a:tc>
+                  <a:txBody>
+                    <a:bodyPr/>
+                    <a:lstStyle/>
+                    <a:p>
+                      <a:pPr algn="ctr"/>
+                      <a:r>
+                        <a:rPr lang="en-US" sz="1600" b="1" dirty="0">
+                          <a:latin typeface="Courier New" panose="02070309020205020404" pitchFamily="49" charset="0"/>
+                          <a:cs typeface="Courier New" panose="02070309020205020404" pitchFamily="49" charset="0"/>
+                        </a:rPr>
+                        <a:t>D0[6]</a:t>
+                      </a:r>
+                    </a:p>
+                  </a:txBody>
+                  <a:tcPr/>
+                </a:tc>
+                <a:tc>
+                  <a:txBody>
+                    <a:bodyPr/>
+                    <a:lstStyle/>
+                    <a:p>
+                      <a:pPr algn="ctr"/>
+                      <a:r>
+                        <a:rPr lang="en-US" sz="1600" b="1" dirty="0">
+                          <a:latin typeface="Courier New" panose="02070309020205020404" pitchFamily="49" charset="0"/>
+                          <a:cs typeface="Courier New" panose="02070309020205020404" pitchFamily="49" charset="0"/>
+                        </a:rPr>
+                        <a:t>D0[7]</a:t>
+                      </a:r>
+                    </a:p>
+                  </a:txBody>
+                  <a:tcPr/>
+                </a:tc>
+                <a:extLst>
+                  <a:ext uri="{0D108BD9-81ED-4DB2-BD59-A6C34878D82A}">
+                    <a16:rowId xmlns:a16="http://schemas.microsoft.com/office/drawing/2014/main" val="2955367424"/>
+                  </a:ext>
+                </a:extLst>
+              </a:tr>
+            </a:tbl>
+          </a:graphicData>
+        </a:graphic>
+      </p:graphicFrame>
+    </p:spTree>
+    <p:extLst>
+      <p:ext uri="{BB962C8B-B14F-4D97-AF65-F5344CB8AC3E}">
+        <p14:creationId xmlns:p14="http://schemas.microsoft.com/office/powerpoint/2010/main" val="694893677"/>
+      </p:ext>
+    </p:extLst>
+  </p:cSld>
+  <p:clrMapOvr>
+    <a:masterClrMapping/>
+  </p:clrMapOvr>
+</p:sld>
+</file>
+
+<file path=ppt/slides/slide11.xml><?xml version="1.0" encoding="utf-8"?>
+<p:sld xmlns:a="http://schemas.openxmlformats.org/drawingml/2006/main" xmlns:r="http://schemas.openxmlformats.org/officeDocument/2006/relationships" xmlns:p="http://schemas.openxmlformats.org/presentationml/2006/main">
+  <p:cSld>
+    <p:spTree>
+      <p:nvGrpSpPr>
+        <p:cNvPr id="1" name=""/>
+        <p:cNvGrpSpPr/>
+        <p:nvPr/>
+      </p:nvGrpSpPr>
+      <p:grpSpPr>
+        <a:xfrm>
+          <a:off x="0" y="0"/>
+          <a:ext cx="0" cy="0"/>
+          <a:chOff x="0" y="0"/>
+          <a:chExt cx="0" cy="0"/>
+        </a:xfrm>
+      </p:grpSpPr>
+      <p:sp>
+        <p:nvSpPr>
+          <p:cNvPr id="2" name="Title 1">
+            <a:extLst>
+              <a:ext uri="{FF2B5EF4-FFF2-40B4-BE49-F238E27FC236}">
+                <a16:creationId xmlns:a16="http://schemas.microsoft.com/office/drawing/2014/main" id="{35FD946A-F189-7A4F-92BB-FFD0D17BC78A}"/>
+              </a:ext>
+            </a:extLst>
+          </p:cNvPr>
+          <p:cNvSpPr>
+            <a:spLocks noGrp="1"/>
+          </p:cNvSpPr>
+          <p:nvPr>
+            <p:ph type="title"/>
+          </p:nvPr>
+        </p:nvSpPr>
+        <p:spPr/>
+        <p:txBody>
+          <a:bodyPr/>
+          <a:lstStyle/>
+          <a:p>
+            <a:r>
+              <a:rPr lang="en-US" dirty="0"/>
+              <a:t>ARM NEON loads and stores</a:t>
+            </a:r>
+          </a:p>
+        </p:txBody>
+      </p:sp>
+      <p:sp>
+        <p:nvSpPr>
+          <p:cNvPr id="3" name="Content Placeholder 2">
+            <a:extLst>
+              <a:ext uri="{FF2B5EF4-FFF2-40B4-BE49-F238E27FC236}">
+                <a16:creationId xmlns:a16="http://schemas.microsoft.com/office/drawing/2014/main" id="{E39201AB-6D25-CA4C-A296-E69EE5F74260}"/>
+              </a:ext>
+            </a:extLst>
+          </p:cNvPr>
+          <p:cNvSpPr>
+            <a:spLocks noGrp="1"/>
+          </p:cNvSpPr>
+          <p:nvPr>
+            <p:ph idx="1"/>
+          </p:nvPr>
+        </p:nvSpPr>
+        <p:spPr/>
+        <p:txBody>
+          <a:bodyPr/>
+          <a:lstStyle/>
+          <a:p>
+            <a:r>
+              <a:rPr lang="en-US" dirty="0"/>
+              <a:t>The simplest example of a load:</a:t>
+            </a:r>
+          </a:p>
+          <a:p>
+            <a:pPr lvl="1"/>
+            <a:r>
+              <a:rPr lang="en-US" dirty="0"/>
+              <a:t>VLDR D0, [R0] – load 64 bits starting at the address in R0 into NEON register D0</a:t>
+            </a:r>
+          </a:p>
+          <a:p>
+            <a:r>
+              <a:rPr lang="en-US" dirty="0"/>
+              <a:t>For 128 bits we simply use one of the Q registers</a:t>
+            </a:r>
+          </a:p>
+          <a:p>
+            <a:pPr lvl="1"/>
+            <a:r>
+              <a:rPr lang="en-US" dirty="0"/>
+              <a:t>VLDR Q1, [R0]</a:t>
+            </a:r>
+          </a:p>
+          <a:p>
+            <a:r>
+              <a:rPr lang="en-US" dirty="0"/>
+              <a:t>VSTR is the comparable store instruction.</a:t>
+            </a:r>
+          </a:p>
+          <a:p>
+            <a:r>
+              <a:rPr lang="en-US" dirty="0"/>
+              <a:t>NEON also provides sophisticated loads and stores that can de-interleave data as it’s loaded or only modify parts of NEON registers.  One can also load multiple registers at once.</a:t>
+            </a:r>
+          </a:p>
+          <a:p>
+            <a:pPr lvl="1"/>
+            <a:r>
+              <a:rPr lang="en-US"/>
+              <a:t>VLD 1.1</a:t>
+            </a:r>
+            <a:endParaRPr lang="en-US" dirty="0"/>
+          </a:p>
+          <a:p>
+            <a:pPr lvl="1"/>
+            <a:endParaRPr lang="en-US" dirty="0"/>
+          </a:p>
+          <a:p>
+            <a:pPr lvl="1"/>
+            <a:endParaRPr lang="en-US" dirty="0"/>
+          </a:p>
+          <a:p>
+            <a:endParaRPr lang="en-US" dirty="0"/>
+          </a:p>
+          <a:p>
+            <a:endParaRPr lang="en-US" dirty="0"/>
+          </a:p>
+          <a:p>
+            <a:endParaRPr lang="en-US" dirty="0"/>
+          </a:p>
+        </p:txBody>
+      </p:sp>
+      <p:sp>
+        <p:nvSpPr>
+          <p:cNvPr id="4" name="Footer Placeholder 3">
+            <a:extLst>
+              <a:ext uri="{FF2B5EF4-FFF2-40B4-BE49-F238E27FC236}">
+                <a16:creationId xmlns:a16="http://schemas.microsoft.com/office/drawing/2014/main" id="{008E2A55-60B3-F647-BA43-63A59B36B6B1}"/>
+              </a:ext>
+            </a:extLst>
+          </p:cNvPr>
+          <p:cNvSpPr>
+            <a:spLocks noGrp="1"/>
+          </p:cNvSpPr>
+          <p:nvPr>
+            <p:ph type="ftr" sz="quarter" idx="11"/>
+          </p:nvPr>
+        </p:nvSpPr>
+        <p:spPr/>
+        <p:txBody>
+          <a:bodyPr/>
+          <a:lstStyle/>
+          <a:p>
+            <a:r>
+              <a:rPr lang="en-US"/>
+              <a:t>ToUCH Project</a:t>
+            </a:r>
+          </a:p>
+        </p:txBody>
+      </p:sp>
+      <p:sp>
+        <p:nvSpPr>
+          <p:cNvPr id="5" name="Slide Number Placeholder 4">
+            <a:extLst>
+              <a:ext uri="{FF2B5EF4-FFF2-40B4-BE49-F238E27FC236}">
+                <a16:creationId xmlns:a16="http://schemas.microsoft.com/office/drawing/2014/main" id="{1B33D5D7-426D-FB4B-AB1D-841DF37B3DFC}"/>
+              </a:ext>
+            </a:extLst>
+          </p:cNvPr>
+          <p:cNvSpPr>
+            <a:spLocks noGrp="1"/>
+          </p:cNvSpPr>
+          <p:nvPr>
+            <p:ph type="sldNum" sz="quarter" idx="12"/>
+          </p:nvPr>
+        </p:nvSpPr>
+        <p:spPr/>
+        <p:txBody>
+          <a:bodyPr/>
+          <a:lstStyle/>
+          <a:p>
+            <a:fld id="{1BD72A7C-CD32-D543-9541-5D4E9CD9F017}" type="slidenum">
+              <a:rPr lang="en-US" smtClean="0"/>
+              <a:t>11</a:t>
+            </a:fld>
+            <a:endParaRPr lang="en-US"/>
+          </a:p>
+        </p:txBody>
+      </p:sp>
+    </p:spTree>
+    <p:extLst>
+      <p:ext uri="{BB962C8B-B14F-4D97-AF65-F5344CB8AC3E}">
+        <p14:creationId xmlns:p14="http://schemas.microsoft.com/office/powerpoint/2010/main" val="4098520964"/>
+      </p:ext>
+    </p:extLst>
+  </p:cSld>
+  <p:clrMapOvr>
+    <a:masterClrMapping/>
+  </p:clrMapOvr>
+</p:sld>
+</file>
+
+<file path=ppt/slides/slide12.xml><?xml version="1.0" encoding="utf-8"?>
+<p:sld xmlns:a="http://schemas.openxmlformats.org/drawingml/2006/main" xmlns:r="http://schemas.openxmlformats.org/officeDocument/2006/relationships" xmlns:p="http://schemas.openxmlformats.org/presentationml/2006/main">
+  <p:cSld>
+    <p:spTree>
+      <p:nvGrpSpPr>
+        <p:cNvPr id="1" name=""/>
+        <p:cNvGrpSpPr/>
+        <p:nvPr/>
+      </p:nvGrpSpPr>
+      <p:grpSpPr>
+        <a:xfrm>
+          <a:off x="0" y="0"/>
+          <a:ext cx="0" cy="0"/>
+          <a:chOff x="0" y="0"/>
+          <a:chExt cx="0" cy="0"/>
+        </a:xfrm>
+      </p:grpSpPr>
+      <p:sp>
+        <p:nvSpPr>
+          <p:cNvPr id="2" name="Title 1">
+            <a:extLst>
+              <a:ext uri="{FF2B5EF4-FFF2-40B4-BE49-F238E27FC236}">
+                <a16:creationId xmlns:a16="http://schemas.microsoft.com/office/drawing/2014/main" id="{35FD946A-F189-7A4F-92BB-FFD0D17BC78A}"/>
+              </a:ext>
+            </a:extLst>
+          </p:cNvPr>
+          <p:cNvSpPr>
+            <a:spLocks noGrp="1"/>
+          </p:cNvSpPr>
+          <p:nvPr>
+            <p:ph type="title"/>
+          </p:nvPr>
+        </p:nvSpPr>
+        <p:spPr/>
+        <p:txBody>
+          <a:bodyPr/>
+          <a:lstStyle/>
+          <a:p>
+            <a:r>
+              <a:rPr lang="en-US" dirty="0"/>
+              <a:t>ARM NEON code examples</a:t>
+            </a:r>
+          </a:p>
+        </p:txBody>
+      </p:sp>
+      <p:sp>
+        <p:nvSpPr>
+          <p:cNvPr id="3" name="Content Placeholder 2">
+            <a:extLst>
+              <a:ext uri="{FF2B5EF4-FFF2-40B4-BE49-F238E27FC236}">
+                <a16:creationId xmlns:a16="http://schemas.microsoft.com/office/drawing/2014/main" id="{E39201AB-6D25-CA4C-A296-E69EE5F74260}"/>
+              </a:ext>
+            </a:extLst>
+          </p:cNvPr>
+          <p:cNvSpPr>
+            <a:spLocks noGrp="1"/>
+          </p:cNvSpPr>
+          <p:nvPr>
+            <p:ph idx="1"/>
+          </p:nvPr>
+        </p:nvSpPr>
+        <p:spPr/>
+        <p:txBody>
+          <a:bodyPr/>
+          <a:lstStyle/>
+          <a:p>
+            <a:r>
+              <a:rPr lang="en-US" dirty="0"/>
+              <a:t>Show some NEON instructions and their SISD equivalents</a:t>
+            </a:r>
+          </a:p>
+          <a:p>
+            <a:endParaRPr lang="en-US" dirty="0"/>
+          </a:p>
+          <a:p>
+            <a:endParaRPr lang="en-US" dirty="0"/>
+          </a:p>
+        </p:txBody>
+      </p:sp>
+      <p:sp>
+        <p:nvSpPr>
+          <p:cNvPr id="4" name="Footer Placeholder 3">
+            <a:extLst>
+              <a:ext uri="{FF2B5EF4-FFF2-40B4-BE49-F238E27FC236}">
+                <a16:creationId xmlns:a16="http://schemas.microsoft.com/office/drawing/2014/main" id="{008E2A55-60B3-F647-BA43-63A59B36B6B1}"/>
+              </a:ext>
+            </a:extLst>
+          </p:cNvPr>
+          <p:cNvSpPr>
+            <a:spLocks noGrp="1"/>
+          </p:cNvSpPr>
+          <p:nvPr>
+            <p:ph type="ftr" sz="quarter" idx="11"/>
+          </p:nvPr>
+        </p:nvSpPr>
+        <p:spPr/>
+        <p:txBody>
+          <a:bodyPr/>
+          <a:lstStyle/>
+          <a:p>
+            <a:r>
+              <a:rPr lang="en-US"/>
+              <a:t>ToUCH Project</a:t>
+            </a:r>
+          </a:p>
+        </p:txBody>
+      </p:sp>
+      <p:sp>
+        <p:nvSpPr>
+          <p:cNvPr id="5" name="Slide Number Placeholder 4">
+            <a:extLst>
+              <a:ext uri="{FF2B5EF4-FFF2-40B4-BE49-F238E27FC236}">
+                <a16:creationId xmlns:a16="http://schemas.microsoft.com/office/drawing/2014/main" id="{1B33D5D7-426D-FB4B-AB1D-841DF37B3DFC}"/>
+              </a:ext>
+            </a:extLst>
+          </p:cNvPr>
+          <p:cNvSpPr>
+            <a:spLocks noGrp="1"/>
+          </p:cNvSpPr>
+          <p:nvPr>
+            <p:ph type="sldNum" sz="quarter" idx="12"/>
+          </p:nvPr>
+        </p:nvSpPr>
+        <p:spPr/>
+        <p:txBody>
+          <a:bodyPr/>
+          <a:lstStyle/>
+          <a:p>
+            <a:fld id="{1BD72A7C-CD32-D543-9541-5D4E9CD9F017}" type="slidenum">
+              <a:rPr lang="en-US" smtClean="0"/>
+              <a:t>12</a:t>
+            </a:fld>
+            <a:endParaRPr lang="en-US"/>
+          </a:p>
+        </p:txBody>
+      </p:sp>
+    </p:spTree>
+    <p:extLst>
+      <p:ext uri="{BB962C8B-B14F-4D97-AF65-F5344CB8AC3E}">
+        <p14:creationId xmlns:p14="http://schemas.microsoft.com/office/powerpoint/2010/main" val="402755280"/>
+      </p:ext>
+    </p:extLst>
+  </p:cSld>
+  <p:clrMapOvr>
+    <a:masterClrMapping/>
+  </p:clrMapOvr>
+</p:sld>
+</file>
+
+<file path=ppt/slides/slide13.xml><?xml version="1.0" encoding="utf-8"?>
+<p:sld xmlns:a="http://schemas.openxmlformats.org/drawingml/2006/main" xmlns:r="http://schemas.openxmlformats.org/officeDocument/2006/relationships" xmlns:p="http://schemas.openxmlformats.org/presentationml/2006/main">
+  <p:cSld>
+    <p:spTree>
+      <p:nvGrpSpPr>
+        <p:cNvPr id="1" name=""/>
+        <p:cNvGrpSpPr/>
+        <p:nvPr/>
+      </p:nvGrpSpPr>
+      <p:grpSpPr>
+        <a:xfrm>
+          <a:off x="0" y="0"/>
+          <a:ext cx="0" cy="0"/>
+          <a:chOff x="0" y="0"/>
+          <a:chExt cx="0" cy="0"/>
+        </a:xfrm>
+      </p:grpSpPr>
+      <p:sp>
+        <p:nvSpPr>
+          <p:cNvPr id="2" name="Title 1">
+            <a:extLst>
+              <a:ext uri="{FF2B5EF4-FFF2-40B4-BE49-F238E27FC236}">
+                <a16:creationId xmlns:a16="http://schemas.microsoft.com/office/drawing/2014/main" id="{EF092DEB-97F8-0543-A855-DC18A03ABEC2}"/>
+              </a:ext>
+            </a:extLst>
+          </p:cNvPr>
+          <p:cNvSpPr>
+            <a:spLocks noGrp="1"/>
+          </p:cNvSpPr>
+          <p:nvPr>
+            <p:ph type="title"/>
+          </p:nvPr>
+        </p:nvSpPr>
+        <p:spPr/>
+        <p:txBody>
+          <a:bodyPr/>
+          <a:lstStyle/>
+          <a:p>
+            <a:r>
+              <a:rPr lang="en-US" dirty="0"/>
+              <a:t>References</a:t>
+            </a:r>
+          </a:p>
+        </p:txBody>
+      </p:sp>
+      <p:sp>
+        <p:nvSpPr>
+          <p:cNvPr id="3" name="Content Placeholder 2">
+            <a:extLst>
+              <a:ext uri="{FF2B5EF4-FFF2-40B4-BE49-F238E27FC236}">
+                <a16:creationId xmlns:a16="http://schemas.microsoft.com/office/drawing/2014/main" id="{D1993F37-B24F-D849-956D-2F08000EA1EC}"/>
+              </a:ext>
+            </a:extLst>
+          </p:cNvPr>
+          <p:cNvSpPr>
+            <a:spLocks noGrp="1"/>
+          </p:cNvSpPr>
+          <p:nvPr>
+            <p:ph idx="1"/>
+          </p:nvPr>
+        </p:nvSpPr>
+        <p:spPr/>
+        <p:txBody>
+          <a:bodyPr/>
+          <a:lstStyle/>
+          <a:p>
+            <a:r>
+              <a:rPr lang="en-US" dirty="0">
+                <a:hlinkClick r:id="rId2"/>
+              </a:rPr>
+              <a:t>https://developer.arm.com/architectures/instruction-sets/simd-isas/neon</a:t>
+            </a:r>
+            <a:endParaRPr lang="en-US" dirty="0"/>
+          </a:p>
+          <a:p>
+            <a:r>
+              <a:rPr lang="en-US" dirty="0">
+                <a:hlinkClick r:id="rId3"/>
+              </a:rPr>
+              <a:t>https://developer.arm.com/documentation/ddi0344/k/neon-and-vfp-programmers-model/about-the-neon-and-vfp-programmers-model/neon-media-coprocessor</a:t>
+            </a:r>
+            <a:endParaRPr lang="en-US" dirty="0"/>
+          </a:p>
+          <a:p>
+            <a:r>
+              <a:rPr lang="en-US" dirty="0">
+                <a:hlinkClick r:id="rId4"/>
+              </a:rPr>
+              <a:t>https://elinux.org/images/4/40/Elc2011_anderson_arm.pdf</a:t>
+            </a:r>
+            <a:endParaRPr lang="en-US" dirty="0"/>
+          </a:p>
+          <a:p>
+            <a:r>
+              <a:rPr lang="en-US" dirty="0">
+                <a:hlinkClick r:id="rId5"/>
+              </a:rPr>
+              <a:t>http://www.add.ece.ufl.edu/4924/docs/arm/ARM%20NEON%20Development.pdf</a:t>
+            </a:r>
+            <a:endParaRPr lang="en-US" dirty="0"/>
+          </a:p>
+          <a:p>
+            <a:r>
+              <a:rPr lang="en-US" dirty="0">
+                <a:hlinkClick r:id="rId6"/>
+              </a:rPr>
+              <a:t>http://download.xskernel.org/docs/processors/cortex-a53/neon_tutorial.pdf</a:t>
+            </a:r>
+            <a:endParaRPr lang="en-US" dirty="0"/>
+          </a:p>
+          <a:p>
+            <a:pPr marL="137160" indent="0">
+              <a:buNone/>
+            </a:pPr>
+            <a:endParaRPr lang="en-US" dirty="0"/>
+          </a:p>
+          <a:p>
+            <a:endParaRPr lang="en-US" dirty="0"/>
+          </a:p>
+          <a:p>
+            <a:endParaRPr lang="en-US" dirty="0"/>
+          </a:p>
+        </p:txBody>
+      </p:sp>
+      <p:sp>
+        <p:nvSpPr>
+          <p:cNvPr id="4" name="Footer Placeholder 3">
+            <a:extLst>
+              <a:ext uri="{FF2B5EF4-FFF2-40B4-BE49-F238E27FC236}">
+                <a16:creationId xmlns:a16="http://schemas.microsoft.com/office/drawing/2014/main" id="{FB4B97A4-D28B-5149-92E4-B01C3AF039EE}"/>
+              </a:ext>
+            </a:extLst>
+          </p:cNvPr>
+          <p:cNvSpPr>
+            <a:spLocks noGrp="1"/>
+          </p:cNvSpPr>
+          <p:nvPr>
+            <p:ph type="ftr" sz="quarter" idx="11"/>
+          </p:nvPr>
+        </p:nvSpPr>
+        <p:spPr/>
+        <p:txBody>
+          <a:bodyPr/>
+          <a:lstStyle/>
+          <a:p>
+            <a:r>
+              <a:rPr lang="en-US"/>
+              <a:t>ToUCH Project</a:t>
+            </a:r>
+          </a:p>
+        </p:txBody>
+      </p:sp>
+      <p:sp>
+        <p:nvSpPr>
+          <p:cNvPr id="5" name="Slide Number Placeholder 4">
+            <a:extLst>
+              <a:ext uri="{FF2B5EF4-FFF2-40B4-BE49-F238E27FC236}">
+                <a16:creationId xmlns:a16="http://schemas.microsoft.com/office/drawing/2014/main" id="{4C0B28D4-7EB7-AC46-8AE6-3C79A58E9107}"/>
+              </a:ext>
+            </a:extLst>
+          </p:cNvPr>
+          <p:cNvSpPr>
+            <a:spLocks noGrp="1"/>
+          </p:cNvSpPr>
+          <p:nvPr>
+            <p:ph type="sldNum" sz="quarter" idx="12"/>
+          </p:nvPr>
+        </p:nvSpPr>
+        <p:spPr/>
+        <p:txBody>
+          <a:bodyPr/>
+          <a:lstStyle/>
+          <a:p>
+            <a:fld id="{1BD72A7C-CD32-D543-9541-5D4E9CD9F017}" type="slidenum">
+              <a:rPr lang="en-US" smtClean="0"/>
+              <a:t>13</a:t>
+            </a:fld>
+            <a:endParaRPr lang="en-US"/>
+          </a:p>
+        </p:txBody>
+      </p:sp>
+    </p:spTree>
+    <p:extLst>
+      <p:ext uri="{BB962C8B-B14F-4D97-AF65-F5344CB8AC3E}">
+        <p14:creationId xmlns:p14="http://schemas.microsoft.com/office/powerpoint/2010/main" val="2398559693"/>
+      </p:ext>
+    </p:extLst>
+  </p:cSld>
+  <p:clrMapOvr>
+    <a:masterClrMapping/>
+  </p:clrMapOvr>
+</p:sld>
+</file>
+
+<file path=ppt/slides/slide14.xml><?xml version="1.0" encoding="utf-8"?>
+<p:sld xmlns:a="http://schemas.openxmlformats.org/drawingml/2006/main" xmlns:r="http://schemas.openxmlformats.org/officeDocument/2006/relationships" xmlns:p="http://schemas.openxmlformats.org/presentationml/2006/main">
+  <p:cSld>
+    <p:spTree>
+      <p:nvGrpSpPr>
+        <p:cNvPr id="1" name=""/>
+        <p:cNvGrpSpPr/>
+        <p:nvPr/>
+      </p:nvGrpSpPr>
+      <p:grpSpPr>
+        <a:xfrm>
+          <a:off x="0" y="0"/>
+          <a:ext cx="0" cy="0"/>
+          <a:chOff x="0" y="0"/>
+          <a:chExt cx="0" cy="0"/>
+        </a:xfrm>
+      </p:grpSpPr>
+      <p:sp>
+        <p:nvSpPr>
+          <p:cNvPr id="2" name="Title 1">
+            <a:extLst>
+              <a:ext uri="{FF2B5EF4-FFF2-40B4-BE49-F238E27FC236}">
                 <a16:creationId xmlns:a16="http://schemas.microsoft.com/office/drawing/2014/main" id="{768D8668-132F-2849-A658-3A55E8CA5F82}"/>
               </a:ext>
             </a:extLst>
@@ -4596,11 +6219,21 @@
           <a:p>
             <a:r>
               <a:rPr lang="en-US" dirty="0"/>
-              <a:t>What is SIMD, and how does it </a:t>
-            </a:r>
-            <a:r>
-              <a:rPr lang="en-US"/>
-              <a:t>improve performance?</a:t>
+              <a:t>What is SIMD, and how does it improve performance?</a:t>
+            </a:r>
+          </a:p>
+          <a:p>
+            <a:pPr lvl="1"/>
+            <a:r>
+              <a:rPr lang="en-US" dirty="0"/>
+              <a:t>Multiple arithmetic operations can take place in parallel.</a:t>
+            </a:r>
+          </a:p>
+          <a:p>
+            <a:pPr lvl="1"/>
+            <a:r>
+              <a:rPr lang="en-US" dirty="0"/>
+              <a:t>This can reduce the total number of clock cycles required to complete a computation</a:t>
             </a:r>
           </a:p>
           <a:p>
@@ -4676,7 +6309,7 @@
           <a:p>
             <a:fld id="{1BD72A7C-CD32-D543-9541-5D4E9CD9F017}" type="slidenum">
               <a:rPr lang="en-US" smtClean="0"/>
-              <a:t>10</a:t>
+              <a:t>14</a:t>
             </a:fld>
             <a:endParaRPr lang="en-US"/>
           </a:p>
@@ -4743,33 +6376,15 @@
                                   </p:childTnLst>
                                 </p:cTn>
                               </p:par>
-                            </p:childTnLst>
-                          </p:cTn>
-                        </p:par>
-                      </p:childTnLst>
-                    </p:cTn>
-                  </p:par>
-                  <p:par>
-                    <p:cTn id="7" fill="hold">
-                      <p:stCondLst>
-                        <p:cond delay="indefinite"/>
-                      </p:stCondLst>
-                      <p:childTnLst>
-                        <p:par>
-                          <p:cTn id="8" fill="hold">
-                            <p:stCondLst>
-                              <p:cond delay="0"/>
-                            </p:stCondLst>
-                            <p:childTnLst>
                               <p:par>
-                                <p:cTn id="9" presetID="1" presetClass="entr" presetSubtype="0" fill="hold" grpId="0" nodeType="clickEffect">
+                                <p:cTn id="7" presetID="1" presetClass="entr" presetSubtype="0" fill="hold" grpId="0" nodeType="withEffect">
                                   <p:stCondLst>
                                     <p:cond delay="0"/>
                                   </p:stCondLst>
                                   <p:childTnLst>
                                     <p:set>
                                       <p:cBhvr>
-                                        <p:cTn id="10" dur="1" fill="hold">
+                                        <p:cTn id="8" dur="1" fill="hold">
                                           <p:stCondLst>
                                             <p:cond delay="0"/>
                                           </p:stCondLst>
@@ -4793,14 +6408,14 @@
                                 </p:cTn>
                               </p:par>
                               <p:par>
-                                <p:cTn id="11" presetID="1" presetClass="entr" presetSubtype="0" fill="hold" grpId="0" nodeType="withEffect">
+                                <p:cTn id="9" presetID="1" presetClass="entr" presetSubtype="0" fill="hold" grpId="0" nodeType="withEffect">
                                   <p:stCondLst>
                                     <p:cond delay="0"/>
                                   </p:stCondLst>
                                   <p:childTnLst>
                                     <p:set>
                                       <p:cBhvr>
-                                        <p:cTn id="12" dur="1" fill="hold">
+                                        <p:cTn id="10" dur="1" fill="hold">
                                           <p:stCondLst>
                                             <p:cond delay="0"/>
                                           </p:stCondLst>
@@ -4823,8 +6438,26 @@
                                   </p:childTnLst>
                                 </p:cTn>
                               </p:par>
+                            </p:childTnLst>
+                          </p:cTn>
+                        </p:par>
+                      </p:childTnLst>
+                    </p:cTn>
+                  </p:par>
+                  <p:par>
+                    <p:cTn id="11" fill="hold">
+                      <p:stCondLst>
+                        <p:cond delay="indefinite"/>
+                      </p:stCondLst>
+                      <p:childTnLst>
+                        <p:par>
+                          <p:cTn id="12" fill="hold">
+                            <p:stCondLst>
+                              <p:cond delay="0"/>
+                            </p:stCondLst>
+                            <p:childTnLst>
                               <p:par>
-                                <p:cTn id="13" presetID="1" presetClass="entr" presetSubtype="0" fill="hold" grpId="0" nodeType="withEffect">
+                                <p:cTn id="13" presetID="1" presetClass="entr" presetSubtype="0" fill="hold" grpId="0" nodeType="clickEffect">
                                   <p:stCondLst>
                                     <p:cond delay="0"/>
                                   </p:stCondLst>
@@ -4840,6 +6473,68 @@
                                           <p:spTgt spid="3">
                                             <p:txEl>
                                               <p:pRg st="3" end="3"/>
+                                            </p:txEl>
+                                          </p:spTgt>
+                                        </p:tgtEl>
+                                        <p:attrNameLst>
+                                          <p:attrName>style.visibility</p:attrName>
+                                        </p:attrNameLst>
+                                      </p:cBhvr>
+                                      <p:to>
+                                        <p:strVal val="visible"/>
+                                      </p:to>
+                                    </p:set>
+                                  </p:childTnLst>
+                                </p:cTn>
+                              </p:par>
+                              <p:par>
+                                <p:cTn id="15" presetID="1" presetClass="entr" presetSubtype="0" fill="hold" grpId="0" nodeType="withEffect">
+                                  <p:stCondLst>
+                                    <p:cond delay="0"/>
+                                  </p:stCondLst>
+                                  <p:childTnLst>
+                                    <p:set>
+                                      <p:cBhvr>
+                                        <p:cTn id="16" dur="1" fill="hold">
+                                          <p:stCondLst>
+                                            <p:cond delay="0"/>
+                                          </p:stCondLst>
+                                        </p:cTn>
+                                        <p:tgtEl>
+                                          <p:spTgt spid="3">
+                                            <p:txEl>
+                                              <p:pRg st="4" end="4"/>
+                                            </p:txEl>
+                                          </p:spTgt>
+                                        </p:tgtEl>
+                                        <p:attrNameLst>
+                                          <p:attrName>style.visibility</p:attrName>
+                                        </p:attrNameLst>
+                                      </p:cBhvr>
+                                      <p:to>
+                                        <p:strVal val="visible"/>
+                                      </p:to>
+                                    </p:set>
+                                  </p:childTnLst>
+                                </p:cTn>
+                              </p:par>
+                              <p:par>
+                                <p:cTn id="17" presetID="1" presetClass="entr" presetSubtype="0" fill="hold" grpId="0" nodeType="withEffect">
+                                  <p:stCondLst>
+                                    <p:cond delay="0"/>
+                                  </p:stCondLst>
+                                  <p:childTnLst>
+                                    <p:set>
+                                      <p:cBhvr>
+                                        <p:cTn id="18" dur="1" fill="hold">
+                                          <p:stCondLst>
+                                            <p:cond delay="0"/>
+                                          </p:stCondLst>
+                                        </p:cTn>
+                                        <p:tgtEl>
+                                          <p:spTgt spid="3">
+                                            <p:txEl>
+                                              <p:pRg st="5" end="5"/>
                                             </p:txEl>
                                           </p:spTgt>
                                         </p:tgtEl>
@@ -4888,7 +6583,7 @@
 </p:sld>
 </file>
 
-<file path=ppt/slides/slide11.xml><?xml version="1.0" encoding="utf-8"?>
+<file path=ppt/slides/slide15.xml><?xml version="1.0" encoding="utf-8"?>
 <p:sld xmlns:a="http://schemas.openxmlformats.org/drawingml/2006/main" xmlns:r="http://schemas.openxmlformats.org/officeDocument/2006/relationships" xmlns:p="http://schemas.openxmlformats.org/presentationml/2006/main">
   <p:cSld>
     <p:spTree>
@@ -4970,84 +6665,41 @@
             <a:pPr lvl="1"/>
             <a:r>
               <a:rPr lang="en-US" dirty="0"/>
-              <a:t>Study how a single chip can offer features that trade-off code-size and performance</a:t>
+              <a:t>Find insight into how a SIMD enabled co-processor can speed up certain kinds of algorithms. </a:t>
             </a:r>
           </a:p>
           <a:p>
             <a:pPr lvl="1"/>
             <a:r>
               <a:rPr lang="en-US" dirty="0"/>
-              <a:t>Gain experience using command line tools</a:t>
+              <a:t>Observe the design/complexity vs. speed tradeoffs that SIMD development entails.</a:t>
+            </a:r>
+          </a:p>
+          <a:p>
+            <a:r>
+              <a:rPr lang="en-US" dirty="0"/>
+              <a:t>General Idea</a:t>
             </a:r>
           </a:p>
           <a:p>
             <a:pPr lvl="1"/>
             <a:r>
               <a:rPr lang="en-US" dirty="0"/>
-              <a:t>“The ARM ISA inherently possesses heterogeneity in its design”</a:t>
-            </a:r>
-            <a:r>
-              <a:rPr lang="en-US" baseline="30000" dirty="0"/>
-              <a:t>1 </a:t>
-            </a:r>
+              <a:t>You are given a simple test harness to run and time three different versions of vector addition.</a:t>
+            </a:r>
+          </a:p>
+          <a:p>
+            <a:pPr lvl="1"/>
             <a:r>
               <a:rPr lang="en-US" dirty="0"/>
-              <a:t>and we want to explore that.</a:t>
-            </a:r>
-            <a:endParaRPr lang="en-US" baseline="30000" dirty="0"/>
-          </a:p>
-          <a:p>
+              <a:t>A linear C-code version and a linear assembly version are provided for you.</a:t>
+            </a:r>
+          </a:p>
+          <a:p>
+            <a:pPr lvl="1"/>
             <a:r>
               <a:rPr lang="en-US" dirty="0"/>
-              <a:t>In this lab you are given some C code and will build it for ARM, Thumb-1, and Thumb-2.</a:t>
-            </a:r>
-          </a:p>
-          <a:p>
-            <a:r>
-              <a:rPr lang="en-US" dirty="0"/>
-              <a:t>A </a:t>
-            </a:r>
-            <a:r>
-              <a:rPr lang="en-US" dirty="0" err="1"/>
-              <a:t>makefile</a:t>
-            </a:r>
-            <a:r>
-              <a:rPr lang="en-US" dirty="0"/>
-              <a:t> is provided for you.</a:t>
-            </a:r>
-          </a:p>
-          <a:p>
-            <a:r>
-              <a:rPr lang="en-US" dirty="0"/>
-              <a:t>You will:</a:t>
-            </a:r>
-          </a:p>
-          <a:p>
-            <a:pPr lvl="1"/>
-            <a:r>
-              <a:rPr lang="en-US" dirty="0"/>
-              <a:t>Measure the size of the relevant function for the three different ISA’s</a:t>
-            </a:r>
-          </a:p>
-          <a:p>
-            <a:pPr lvl="1"/>
-            <a:r>
-              <a:rPr lang="en-US" dirty="0"/>
-              <a:t>Measure the performance of the code as compiled for the three different ISA’s</a:t>
-            </a:r>
-          </a:p>
-          <a:p>
-            <a:pPr lvl="1"/>
-            <a:r>
-              <a:rPr lang="en-US" dirty="0"/>
-              <a:t>See the 32-bit, 16-bit, and mixed-bit instructions by disassembling the code.</a:t>
-            </a:r>
-          </a:p>
-          <a:p>
-            <a:pPr lvl="1"/>
-            <a:r>
-              <a:rPr lang="en-US" dirty="0"/>
-              <a:t>Summarize your results and answer some questions.</a:t>
+              <a:t>You will write two versions the vectorized algorithm using ARM’s NEON instructions.</a:t>
             </a:r>
           </a:p>
         </p:txBody>
@@ -5103,84 +6755,9 @@
           <a:p>
             <a:fld id="{1BD72A7C-CD32-D543-9541-5D4E9CD9F017}" type="slidenum">
               <a:rPr lang="en-US" smtClean="0"/>
-              <a:t>11</a:t>
+              <a:t>15</a:t>
             </a:fld>
             <a:endParaRPr lang="en-US"/>
-          </a:p>
-        </p:txBody>
-      </p:sp>
-      <p:sp>
-        <p:nvSpPr>
-          <p:cNvPr id="6" name="TextBox 5">
-            <a:extLst>
-              <a:ext uri="{FF2B5EF4-FFF2-40B4-BE49-F238E27FC236}">
-                <a16:creationId xmlns:a16="http://schemas.microsoft.com/office/drawing/2014/main" id="{80C05BEF-F38B-0942-85B1-349EAFB633CB}"/>
-              </a:ext>
-            </a:extLst>
-          </p:cNvPr>
-          <p:cNvSpPr txBox="1"/>
-          <p:nvPr/>
-        </p:nvSpPr>
-        <p:spPr>
-          <a:xfrm>
-            <a:off x="185530" y="5844207"/>
-            <a:ext cx="11900452" cy="584775"/>
-          </a:xfrm>
-          <a:prstGeom prst="rect">
-            <a:avLst/>
-          </a:prstGeom>
-          <a:noFill/>
-        </p:spPr>
-        <p:txBody>
-          <a:bodyPr wrap="square" rtlCol="0">
-            <a:spAutoFit/>
-          </a:bodyPr>
-          <a:lstStyle/>
-          <a:p>
-            <a:r>
-              <a:rPr lang="en-US" sz="1600" dirty="0"/>
-              <a:t>1. </a:t>
-            </a:r>
-            <a:r>
-              <a:rPr lang="en-US" sz="1600" dirty="0" err="1"/>
-              <a:t>Wooseok</a:t>
-            </a:r>
-            <a:r>
-              <a:rPr lang="en-US" sz="1600" dirty="0"/>
-              <a:t> Lee, Dam </a:t>
-            </a:r>
-            <a:r>
-              <a:rPr lang="en-US" sz="1600" dirty="0" err="1"/>
-              <a:t>Sunwoo</a:t>
-            </a:r>
-            <a:r>
-              <a:rPr lang="en-US" sz="1600" dirty="0"/>
-              <a:t>, Christopher D. Emmons, Andreas </a:t>
-            </a:r>
-            <a:r>
-              <a:rPr lang="en-US" sz="1600" dirty="0" err="1"/>
-              <a:t>Gerstlauer</a:t>
-            </a:r>
-            <a:r>
-              <a:rPr lang="en-US" sz="1600" dirty="0"/>
-              <a:t>, and </a:t>
-            </a:r>
-            <a:r>
-              <a:rPr lang="en-US" sz="1600" dirty="0" err="1"/>
-              <a:t>Lizy</a:t>
-            </a:r>
-            <a:r>
-              <a:rPr lang="en-US" sz="1600" dirty="0"/>
-              <a:t> John </a:t>
-            </a:r>
-            <a:r>
-              <a:rPr lang="en-US" sz="1600" i="1" dirty="0"/>
-              <a:t>Exploring Opportunities for Heterogeneous-ISA Core Architectures in High-Performance Mobile SoCs, </a:t>
-            </a:r>
-            <a:r>
-              <a:rPr lang="en-US" sz="1600" dirty="0"/>
-              <a:t>University of Texas, Technical report, UT-CERC-17-01 March 10, 2017</a:t>
-            </a:r>
           </a:p>
         </p:txBody>
       </p:sp>
@@ -7702,7 +9279,7 @@
           <a:p>
             <a:r>
               <a:rPr lang="en-US" dirty="0"/>
-              <a:t>ARM NEON code examples</a:t>
+              <a:t>ARM NEON code development</a:t>
             </a:r>
           </a:p>
         </p:txBody>
@@ -7730,8 +9307,37 @@
           <a:p>
             <a:r>
               <a:rPr lang="en-US" dirty="0"/>
-              <a:t>Show some NEON instructions and their SISD equivalents</a:t>
-            </a:r>
+              <a:t>The 32 64-bit NEON registers are labeled D0, D1, … D31</a:t>
+            </a:r>
+          </a:p>
+          <a:p>
+            <a:r>
+              <a:rPr lang="en-US" dirty="0"/>
+              <a:t>They can be combined in pairs to create 128-bit registers.</a:t>
+            </a:r>
+          </a:p>
+          <a:p>
+            <a:pPr lvl="1"/>
+            <a:r>
+              <a:rPr lang="en-US" dirty="0"/>
+              <a:t>D0 and D1 map to Q0</a:t>
+            </a:r>
+          </a:p>
+          <a:p>
+            <a:pPr lvl="1"/>
+            <a:r>
+              <a:rPr lang="en-US" dirty="0"/>
+              <a:t>D2 and D3 map to Q1, …</a:t>
+            </a:r>
+          </a:p>
+          <a:p>
+            <a:r>
+              <a:rPr lang="en-US" dirty="0"/>
+              <a:t>These registers can be treated as vectors</a:t>
+            </a:r>
+          </a:p>
+          <a:p>
+            <a:endParaRPr lang="en-US" dirty="0"/>
           </a:p>
           <a:p>
             <a:endParaRPr lang="en-US" dirty="0"/>
@@ -7801,7 +9407,7 @@
     </p:spTree>
     <p:extLst>
       <p:ext uri="{BB962C8B-B14F-4D97-AF65-F5344CB8AC3E}">
-        <p14:creationId xmlns:p14="http://schemas.microsoft.com/office/powerpoint/2010/main" val="402755280"/>
+        <p14:creationId xmlns:p14="http://schemas.microsoft.com/office/powerpoint/2010/main" val="2089050663"/>
       </p:ext>
     </p:extLst>
   </p:cSld>
@@ -7833,7 +9439,7 @@
           <p:cNvPr id="2" name="Title 1">
             <a:extLst>
               <a:ext uri="{FF2B5EF4-FFF2-40B4-BE49-F238E27FC236}">
-                <a16:creationId xmlns:a16="http://schemas.microsoft.com/office/drawing/2014/main" id="{EF092DEB-97F8-0543-A855-DC18A03ABEC2}"/>
+                <a16:creationId xmlns:a16="http://schemas.microsoft.com/office/drawing/2014/main" id="{35FD946A-F189-7A4F-92BB-FFD0D17BC78A}"/>
               </a:ext>
             </a:extLst>
           </p:cNvPr>
@@ -7851,7 +9457,7 @@
           <a:p>
             <a:r>
               <a:rPr lang="en-US" dirty="0"/>
-              <a:t>References</a:t>
+              <a:t>ARM NEON data processing</a:t>
             </a:r>
           </a:p>
         </p:txBody>
@@ -7861,7 +9467,7 @@
           <p:cNvPr id="3" name="Content Placeholder 2">
             <a:extLst>
               <a:ext uri="{FF2B5EF4-FFF2-40B4-BE49-F238E27FC236}">
-                <a16:creationId xmlns:a16="http://schemas.microsoft.com/office/drawing/2014/main" id="{D1993F37-B24F-D849-956D-2F08000EA1EC}"/>
+                <a16:creationId xmlns:a16="http://schemas.microsoft.com/office/drawing/2014/main" id="{E39201AB-6D25-CA4C-A296-E69EE5F74260}"/>
               </a:ext>
             </a:extLst>
           </p:cNvPr>
@@ -7878,26 +9484,40 @@
           <a:lstStyle/>
           <a:p>
             <a:r>
-              <a:rPr lang="en-US">
-                <a:hlinkClick r:id="rId2"/>
+              <a:rPr lang="en-US" dirty="0"/>
+              <a:t>NEON data processing instructions include a suffix to indicate the type and size of data being manipulated. </a:t>
+            </a:r>
+          </a:p>
+          <a:p>
+            <a:r>
+              <a:rPr lang="en-US" sz="1800" b="1" dirty="0">
+                <a:latin typeface="Courier New" panose="02070309020205020404" pitchFamily="49" charset="0"/>
+                <a:cs typeface="Courier New" panose="02070309020205020404" pitchFamily="49" charset="0"/>
               </a:rPr>
-              <a:t>https</a:t>
-            </a:r>
-            <a:r>
-              <a:rPr lang="en-US" dirty="0">
-                <a:hlinkClick r:id="rId2"/>
-              </a:rPr>
-              <a:t>://developer.arm.com/architectures/instruction-sets/simd-isas/neon</a:t>
-            </a:r>
+              <a:t>VADD.I16 Q0, Q1, Q2</a:t>
+            </a:r>
+          </a:p>
+          <a:p>
+            <a:pPr lvl="1"/>
+            <a:r>
+              <a:rPr lang="en-US" dirty="0"/>
+              <a:t>Each 128-bit Q-register is being treated as 8 16-bit signed integers.  The addition will take place like this:</a:t>
+            </a:r>
+          </a:p>
+          <a:p>
+            <a:pPr marL="448056" lvl="1" indent="0">
+              <a:buNone/>
+            </a:pPr>
             <a:endParaRPr lang="en-US" dirty="0"/>
           </a:p>
           <a:p>
-            <a:r>
-              <a:rPr lang="en-US" dirty="0">
-                <a:hlinkClick r:id="rId3"/>
-              </a:rPr>
-              <a:t>https://developer.arm.com/documentation/ddi0344/k/neon-and-vfp-programmers-model/about-the-neon-and-vfp-programmers-model/neon-media-coprocessor</a:t>
-            </a:r>
+            <a:pPr lvl="1"/>
+            <a:endParaRPr lang="en-US" dirty="0"/>
+          </a:p>
+          <a:p>
+            <a:endParaRPr lang="en-US" dirty="0"/>
+          </a:p>
+          <a:p>
             <a:endParaRPr lang="en-US" dirty="0"/>
           </a:p>
           <a:p>
@@ -7910,7 +9530,7 @@
           <p:cNvPr id="4" name="Footer Placeholder 3">
             <a:extLst>
               <a:ext uri="{FF2B5EF4-FFF2-40B4-BE49-F238E27FC236}">
-                <a16:creationId xmlns:a16="http://schemas.microsoft.com/office/drawing/2014/main" id="{FB4B97A4-D28B-5149-92E4-B01C3AF039EE}"/>
+                <a16:creationId xmlns:a16="http://schemas.microsoft.com/office/drawing/2014/main" id="{008E2A55-60B3-F647-BA43-63A59B36B6B1}"/>
               </a:ext>
             </a:extLst>
           </p:cNvPr>
@@ -7938,7 +9558,7 @@
           <p:cNvPr id="5" name="Slide Number Placeholder 4">
             <a:extLst>
               <a:ext uri="{FF2B5EF4-FFF2-40B4-BE49-F238E27FC236}">
-                <a16:creationId xmlns:a16="http://schemas.microsoft.com/office/drawing/2014/main" id="{4C0B28D4-7EB7-AC46-8AE6-3C79A58E9107}"/>
+                <a16:creationId xmlns:a16="http://schemas.microsoft.com/office/drawing/2014/main" id="{1B33D5D7-426D-FB4B-AB1D-841DF37B3DFC}"/>
               </a:ext>
             </a:extLst>
           </p:cNvPr>
@@ -7962,10 +9582,907 @@
           </a:p>
         </p:txBody>
       </p:sp>
+      <p:graphicFrame>
+        <p:nvGraphicFramePr>
+          <p:cNvPr id="6" name="Table 6">
+            <a:extLst>
+              <a:ext uri="{FF2B5EF4-FFF2-40B4-BE49-F238E27FC236}">
+                <a16:creationId xmlns:a16="http://schemas.microsoft.com/office/drawing/2014/main" id="{FFC0C618-BBDF-DF4E-88BE-E57FA32745A2}"/>
+              </a:ext>
+            </a:extLst>
+          </p:cNvPr>
+          <p:cNvGraphicFramePr>
+            <a:graphicFrameLocks noGrp="1"/>
+          </p:cNvGraphicFramePr>
+          <p:nvPr/>
+        </p:nvGraphicFramePr>
+        <p:xfrm>
+          <a:off x="2078299" y="3543890"/>
+          <a:ext cx="7112000" cy="1768890"/>
+        </p:xfrm>
+        <a:graphic>
+          <a:graphicData uri="http://schemas.openxmlformats.org/drawingml/2006/table">
+            <a:tbl>
+              <a:tblPr firstRow="1" bandRow="1">
+                <a:tableStyleId>{16D9F66E-5EB9-4882-86FB-DCBF35E3C3E4}</a:tableStyleId>
+              </a:tblPr>
+              <a:tblGrid>
+                <a:gridCol w="889000">
+                  <a:extLst>
+                    <a:ext uri="{9D8B030D-6E8A-4147-A177-3AD203B41FA5}">
+                      <a16:colId xmlns:a16="http://schemas.microsoft.com/office/drawing/2014/main" val="489603817"/>
+                    </a:ext>
+                  </a:extLst>
+                </a:gridCol>
+                <a:gridCol w="889000">
+                  <a:extLst>
+                    <a:ext uri="{9D8B030D-6E8A-4147-A177-3AD203B41FA5}">
+                      <a16:colId xmlns:a16="http://schemas.microsoft.com/office/drawing/2014/main" val="1447518166"/>
+                    </a:ext>
+                  </a:extLst>
+                </a:gridCol>
+                <a:gridCol w="889000">
+                  <a:extLst>
+                    <a:ext uri="{9D8B030D-6E8A-4147-A177-3AD203B41FA5}">
+                      <a16:colId xmlns:a16="http://schemas.microsoft.com/office/drawing/2014/main" val="1949260619"/>
+                    </a:ext>
+                  </a:extLst>
+                </a:gridCol>
+                <a:gridCol w="889000">
+                  <a:extLst>
+                    <a:ext uri="{9D8B030D-6E8A-4147-A177-3AD203B41FA5}">
+                      <a16:colId xmlns:a16="http://schemas.microsoft.com/office/drawing/2014/main" val="3294147728"/>
+                    </a:ext>
+                  </a:extLst>
+                </a:gridCol>
+                <a:gridCol w="889000">
+                  <a:extLst>
+                    <a:ext uri="{9D8B030D-6E8A-4147-A177-3AD203B41FA5}">
+                      <a16:colId xmlns:a16="http://schemas.microsoft.com/office/drawing/2014/main" val="3298937190"/>
+                    </a:ext>
+                  </a:extLst>
+                </a:gridCol>
+                <a:gridCol w="889000">
+                  <a:extLst>
+                    <a:ext uri="{9D8B030D-6E8A-4147-A177-3AD203B41FA5}">
+                      <a16:colId xmlns:a16="http://schemas.microsoft.com/office/drawing/2014/main" val="3598892603"/>
+                    </a:ext>
+                  </a:extLst>
+                </a:gridCol>
+                <a:gridCol w="889000">
+                  <a:extLst>
+                    <a:ext uri="{9D8B030D-6E8A-4147-A177-3AD203B41FA5}">
+                      <a16:colId xmlns:a16="http://schemas.microsoft.com/office/drawing/2014/main" val="558931131"/>
+                    </a:ext>
+                  </a:extLst>
+                </a:gridCol>
+                <a:gridCol w="889000">
+                  <a:extLst>
+                    <a:ext uri="{9D8B030D-6E8A-4147-A177-3AD203B41FA5}">
+                      <a16:colId xmlns:a16="http://schemas.microsoft.com/office/drawing/2014/main" val="379065270"/>
+                    </a:ext>
+                  </a:extLst>
+                </a:gridCol>
+              </a:tblGrid>
+              <a:tr h="353778">
+                <a:tc>
+                  <a:txBody>
+                    <a:bodyPr/>
+                    <a:lstStyle/>
+                    <a:p>
+                      <a:pPr algn="ctr"/>
+                      <a:r>
+                        <a:rPr lang="en-US" sz="1600" b="1" dirty="0">
+                          <a:latin typeface="Courier New" panose="02070309020205020404" pitchFamily="49" charset="0"/>
+                          <a:cs typeface="Courier New" panose="02070309020205020404" pitchFamily="49" charset="0"/>
+                        </a:rPr>
+                        <a:t>Q1[0]</a:t>
+                      </a:r>
+                    </a:p>
+                  </a:txBody>
+                  <a:tcPr/>
+                </a:tc>
+                <a:tc>
+                  <a:txBody>
+                    <a:bodyPr/>
+                    <a:lstStyle/>
+                    <a:p>
+                      <a:pPr algn="ctr"/>
+                      <a:r>
+                        <a:rPr lang="en-US" sz="1600" b="1" dirty="0">
+                          <a:latin typeface="Courier New" panose="02070309020205020404" pitchFamily="49" charset="0"/>
+                          <a:cs typeface="Courier New" panose="02070309020205020404" pitchFamily="49" charset="0"/>
+                        </a:rPr>
+                        <a:t>Q1[1]</a:t>
+                      </a:r>
+                    </a:p>
+                  </a:txBody>
+                  <a:tcPr/>
+                </a:tc>
+                <a:tc>
+                  <a:txBody>
+                    <a:bodyPr/>
+                    <a:lstStyle/>
+                    <a:p>
+                      <a:pPr algn="ctr"/>
+                      <a:r>
+                        <a:rPr lang="en-US" sz="1600" b="1" dirty="0">
+                          <a:latin typeface="Courier New" panose="02070309020205020404" pitchFamily="49" charset="0"/>
+                          <a:cs typeface="Courier New" panose="02070309020205020404" pitchFamily="49" charset="0"/>
+                        </a:rPr>
+                        <a:t>Q1[2]</a:t>
+                      </a:r>
+                    </a:p>
+                  </a:txBody>
+                  <a:tcPr/>
+                </a:tc>
+                <a:tc>
+                  <a:txBody>
+                    <a:bodyPr/>
+                    <a:lstStyle/>
+                    <a:p>
+                      <a:pPr algn="ctr"/>
+                      <a:r>
+                        <a:rPr lang="en-US" sz="1600" b="1" dirty="0">
+                          <a:latin typeface="Courier New" panose="02070309020205020404" pitchFamily="49" charset="0"/>
+                          <a:cs typeface="Courier New" panose="02070309020205020404" pitchFamily="49" charset="0"/>
+                        </a:rPr>
+                        <a:t>Q1[3]</a:t>
+                      </a:r>
+                    </a:p>
+                  </a:txBody>
+                  <a:tcPr/>
+                </a:tc>
+                <a:tc>
+                  <a:txBody>
+                    <a:bodyPr/>
+                    <a:lstStyle/>
+                    <a:p>
+                      <a:pPr algn="ctr"/>
+                      <a:r>
+                        <a:rPr lang="en-US" sz="1600" b="1" dirty="0">
+                          <a:latin typeface="Courier New" panose="02070309020205020404" pitchFamily="49" charset="0"/>
+                          <a:cs typeface="Courier New" panose="02070309020205020404" pitchFamily="49" charset="0"/>
+                        </a:rPr>
+                        <a:t>Q1[4]</a:t>
+                      </a:r>
+                    </a:p>
+                  </a:txBody>
+                  <a:tcPr/>
+                </a:tc>
+                <a:tc>
+                  <a:txBody>
+                    <a:bodyPr/>
+                    <a:lstStyle/>
+                    <a:p>
+                      <a:pPr algn="ctr"/>
+                      <a:r>
+                        <a:rPr lang="en-US" sz="1600" b="1" dirty="0">
+                          <a:latin typeface="Courier New" panose="02070309020205020404" pitchFamily="49" charset="0"/>
+                          <a:cs typeface="Courier New" panose="02070309020205020404" pitchFamily="49" charset="0"/>
+                        </a:rPr>
+                        <a:t>Q1[5]</a:t>
+                      </a:r>
+                    </a:p>
+                  </a:txBody>
+                  <a:tcPr/>
+                </a:tc>
+                <a:tc>
+                  <a:txBody>
+                    <a:bodyPr/>
+                    <a:lstStyle/>
+                    <a:p>
+                      <a:pPr algn="ctr"/>
+                      <a:r>
+                        <a:rPr lang="en-US" sz="1600" b="1" dirty="0">
+                          <a:latin typeface="Courier New" panose="02070309020205020404" pitchFamily="49" charset="0"/>
+                          <a:cs typeface="Courier New" panose="02070309020205020404" pitchFamily="49" charset="0"/>
+                        </a:rPr>
+                        <a:t>Q1[6]</a:t>
+                      </a:r>
+                    </a:p>
+                  </a:txBody>
+                  <a:tcPr/>
+                </a:tc>
+                <a:tc>
+                  <a:txBody>
+                    <a:bodyPr/>
+                    <a:lstStyle/>
+                    <a:p>
+                      <a:pPr algn="ctr"/>
+                      <a:r>
+                        <a:rPr lang="en-US" sz="1600" b="1" dirty="0">
+                          <a:latin typeface="Courier New" panose="02070309020205020404" pitchFamily="49" charset="0"/>
+                          <a:cs typeface="Courier New" panose="02070309020205020404" pitchFamily="49" charset="0"/>
+                        </a:rPr>
+                        <a:t>Q1[7]</a:t>
+                      </a:r>
+                    </a:p>
+                  </a:txBody>
+                  <a:tcPr/>
+                </a:tc>
+                <a:extLst>
+                  <a:ext uri="{0D108BD9-81ED-4DB2-BD59-A6C34878D82A}">
+                    <a16:rowId xmlns:a16="http://schemas.microsoft.com/office/drawing/2014/main" val="1296216866"/>
+                  </a:ext>
+                </a:extLst>
+              </a:tr>
+              <a:tr h="353778">
+                <a:tc>
+                  <a:txBody>
+                    <a:bodyPr/>
+                    <a:lstStyle/>
+                    <a:p>
+                      <a:pPr algn="ctr"/>
+                      <a:r>
+                        <a:rPr lang="en-US" sz="1600" b="1" dirty="0">
+                          <a:latin typeface="Courier New" panose="02070309020205020404" pitchFamily="49" charset="0"/>
+                          <a:cs typeface="Courier New" panose="02070309020205020404" pitchFamily="49" charset="0"/>
+                        </a:rPr>
+                        <a:t>+</a:t>
+                      </a:r>
+                    </a:p>
+                  </a:txBody>
+                  <a:tcPr/>
+                </a:tc>
+                <a:tc>
+                  <a:txBody>
+                    <a:bodyPr/>
+                    <a:lstStyle/>
+                    <a:p>
+                      <a:pPr algn="ctr"/>
+                      <a:r>
+                        <a:rPr lang="en-US" sz="1600" b="1" dirty="0">
+                          <a:latin typeface="Courier New" panose="02070309020205020404" pitchFamily="49" charset="0"/>
+                          <a:cs typeface="Courier New" panose="02070309020205020404" pitchFamily="49" charset="0"/>
+                        </a:rPr>
+                        <a:t>+</a:t>
+                      </a:r>
+                    </a:p>
+                  </a:txBody>
+                  <a:tcPr/>
+                </a:tc>
+                <a:tc>
+                  <a:txBody>
+                    <a:bodyPr/>
+                    <a:lstStyle/>
+                    <a:p>
+                      <a:pPr algn="ctr"/>
+                      <a:r>
+                        <a:rPr lang="en-US" sz="1600" b="1" dirty="0">
+                          <a:latin typeface="Courier New" panose="02070309020205020404" pitchFamily="49" charset="0"/>
+                          <a:cs typeface="Courier New" panose="02070309020205020404" pitchFamily="49" charset="0"/>
+                        </a:rPr>
+                        <a:t>+</a:t>
+                      </a:r>
+                    </a:p>
+                  </a:txBody>
+                  <a:tcPr/>
+                </a:tc>
+                <a:tc>
+                  <a:txBody>
+                    <a:bodyPr/>
+                    <a:lstStyle/>
+                    <a:p>
+                      <a:pPr algn="ctr"/>
+                      <a:r>
+                        <a:rPr lang="en-US" sz="1600" b="1" dirty="0">
+                          <a:latin typeface="Courier New" panose="02070309020205020404" pitchFamily="49" charset="0"/>
+                          <a:cs typeface="Courier New" panose="02070309020205020404" pitchFamily="49" charset="0"/>
+                        </a:rPr>
+                        <a:t>+</a:t>
+                      </a:r>
+                    </a:p>
+                  </a:txBody>
+                  <a:tcPr/>
+                </a:tc>
+                <a:tc>
+                  <a:txBody>
+                    <a:bodyPr/>
+                    <a:lstStyle/>
+                    <a:p>
+                      <a:pPr algn="ctr"/>
+                      <a:r>
+                        <a:rPr lang="en-US" sz="1600" b="1" dirty="0">
+                          <a:latin typeface="Courier New" panose="02070309020205020404" pitchFamily="49" charset="0"/>
+                          <a:cs typeface="Courier New" panose="02070309020205020404" pitchFamily="49" charset="0"/>
+                        </a:rPr>
+                        <a:t>+</a:t>
+                      </a:r>
+                    </a:p>
+                  </a:txBody>
+                  <a:tcPr/>
+                </a:tc>
+                <a:tc>
+                  <a:txBody>
+                    <a:bodyPr/>
+                    <a:lstStyle/>
+                    <a:p>
+                      <a:pPr algn="ctr"/>
+                      <a:r>
+                        <a:rPr lang="en-US" sz="1600" b="1" dirty="0">
+                          <a:latin typeface="Courier New" panose="02070309020205020404" pitchFamily="49" charset="0"/>
+                          <a:cs typeface="Courier New" panose="02070309020205020404" pitchFamily="49" charset="0"/>
+                        </a:rPr>
+                        <a:t>+</a:t>
+                      </a:r>
+                    </a:p>
+                  </a:txBody>
+                  <a:tcPr/>
+                </a:tc>
+                <a:tc>
+                  <a:txBody>
+                    <a:bodyPr/>
+                    <a:lstStyle/>
+                    <a:p>
+                      <a:pPr algn="ctr"/>
+                      <a:r>
+                        <a:rPr lang="en-US" sz="1600" b="1" dirty="0">
+                          <a:latin typeface="Courier New" panose="02070309020205020404" pitchFamily="49" charset="0"/>
+                          <a:cs typeface="Courier New" panose="02070309020205020404" pitchFamily="49" charset="0"/>
+                        </a:rPr>
+                        <a:t>+</a:t>
+                      </a:r>
+                    </a:p>
+                  </a:txBody>
+                  <a:tcPr/>
+                </a:tc>
+                <a:tc>
+                  <a:txBody>
+                    <a:bodyPr/>
+                    <a:lstStyle/>
+                    <a:p>
+                      <a:pPr algn="ctr"/>
+                      <a:r>
+                        <a:rPr lang="en-US" sz="1600" b="1" dirty="0">
+                          <a:latin typeface="Courier New" panose="02070309020205020404" pitchFamily="49" charset="0"/>
+                          <a:cs typeface="Courier New" panose="02070309020205020404" pitchFamily="49" charset="0"/>
+                        </a:rPr>
+                        <a:t>+</a:t>
+                      </a:r>
+                    </a:p>
+                  </a:txBody>
+                  <a:tcPr/>
+                </a:tc>
+                <a:extLst>
+                  <a:ext uri="{0D108BD9-81ED-4DB2-BD59-A6C34878D82A}">
+                    <a16:rowId xmlns:a16="http://schemas.microsoft.com/office/drawing/2014/main" val="3989560634"/>
+                  </a:ext>
+                </a:extLst>
+              </a:tr>
+              <a:tr h="353778">
+                <a:tc>
+                  <a:txBody>
+                    <a:bodyPr/>
+                    <a:lstStyle/>
+                    <a:p>
+                      <a:pPr algn="ctr"/>
+                      <a:r>
+                        <a:rPr lang="en-US" sz="1600" b="1" dirty="0">
+                          <a:latin typeface="Courier New" panose="02070309020205020404" pitchFamily="49" charset="0"/>
+                          <a:cs typeface="Courier New" panose="02070309020205020404" pitchFamily="49" charset="0"/>
+                        </a:rPr>
+                        <a:t>Q2[0]</a:t>
+                      </a:r>
+                    </a:p>
+                  </a:txBody>
+                  <a:tcPr/>
+                </a:tc>
+                <a:tc>
+                  <a:txBody>
+                    <a:bodyPr/>
+                    <a:lstStyle/>
+                    <a:p>
+                      <a:pPr algn="ctr"/>
+                      <a:r>
+                        <a:rPr lang="en-US" sz="1600" b="1" dirty="0">
+                          <a:latin typeface="Courier New" panose="02070309020205020404" pitchFamily="49" charset="0"/>
+                          <a:cs typeface="Courier New" panose="02070309020205020404" pitchFamily="49" charset="0"/>
+                        </a:rPr>
+                        <a:t>Q2[1]</a:t>
+                      </a:r>
+                    </a:p>
+                  </a:txBody>
+                  <a:tcPr/>
+                </a:tc>
+                <a:tc>
+                  <a:txBody>
+                    <a:bodyPr/>
+                    <a:lstStyle/>
+                    <a:p>
+                      <a:pPr algn="ctr"/>
+                      <a:r>
+                        <a:rPr lang="en-US" sz="1600" b="1" dirty="0">
+                          <a:latin typeface="Courier New" panose="02070309020205020404" pitchFamily="49" charset="0"/>
+                          <a:cs typeface="Courier New" panose="02070309020205020404" pitchFamily="49" charset="0"/>
+                        </a:rPr>
+                        <a:t>Q2[2]</a:t>
+                      </a:r>
+                    </a:p>
+                  </a:txBody>
+                  <a:tcPr/>
+                </a:tc>
+                <a:tc>
+                  <a:txBody>
+                    <a:bodyPr/>
+                    <a:lstStyle/>
+                    <a:p>
+                      <a:pPr algn="ctr"/>
+                      <a:r>
+                        <a:rPr lang="en-US" sz="1600" b="1" dirty="0">
+                          <a:latin typeface="Courier New" panose="02070309020205020404" pitchFamily="49" charset="0"/>
+                          <a:cs typeface="Courier New" panose="02070309020205020404" pitchFamily="49" charset="0"/>
+                        </a:rPr>
+                        <a:t>Q2[3]</a:t>
+                      </a:r>
+                    </a:p>
+                  </a:txBody>
+                  <a:tcPr/>
+                </a:tc>
+                <a:tc>
+                  <a:txBody>
+                    <a:bodyPr/>
+                    <a:lstStyle/>
+                    <a:p>
+                      <a:pPr algn="ctr"/>
+                      <a:r>
+                        <a:rPr lang="en-US" sz="1600" b="1" dirty="0">
+                          <a:latin typeface="Courier New" panose="02070309020205020404" pitchFamily="49" charset="0"/>
+                          <a:cs typeface="Courier New" panose="02070309020205020404" pitchFamily="49" charset="0"/>
+                        </a:rPr>
+                        <a:t>Q2[4]</a:t>
+                      </a:r>
+                    </a:p>
+                  </a:txBody>
+                  <a:tcPr/>
+                </a:tc>
+                <a:tc>
+                  <a:txBody>
+                    <a:bodyPr/>
+                    <a:lstStyle/>
+                    <a:p>
+                      <a:pPr algn="ctr"/>
+                      <a:r>
+                        <a:rPr lang="en-US" sz="1600" b="1" dirty="0">
+                          <a:latin typeface="Courier New" panose="02070309020205020404" pitchFamily="49" charset="0"/>
+                          <a:cs typeface="Courier New" panose="02070309020205020404" pitchFamily="49" charset="0"/>
+                        </a:rPr>
+                        <a:t>Q2[5]</a:t>
+                      </a:r>
+                    </a:p>
+                  </a:txBody>
+                  <a:tcPr/>
+                </a:tc>
+                <a:tc>
+                  <a:txBody>
+                    <a:bodyPr/>
+                    <a:lstStyle/>
+                    <a:p>
+                      <a:pPr algn="ctr"/>
+                      <a:r>
+                        <a:rPr lang="en-US" sz="1600" b="1" dirty="0">
+                          <a:latin typeface="Courier New" panose="02070309020205020404" pitchFamily="49" charset="0"/>
+                          <a:cs typeface="Courier New" panose="02070309020205020404" pitchFamily="49" charset="0"/>
+                        </a:rPr>
+                        <a:t>Q2[6]</a:t>
+                      </a:r>
+                    </a:p>
+                  </a:txBody>
+                  <a:tcPr/>
+                </a:tc>
+                <a:tc>
+                  <a:txBody>
+                    <a:bodyPr/>
+                    <a:lstStyle/>
+                    <a:p>
+                      <a:pPr algn="ctr"/>
+                      <a:r>
+                        <a:rPr lang="en-US" sz="1600" b="1" dirty="0">
+                          <a:latin typeface="Courier New" panose="02070309020205020404" pitchFamily="49" charset="0"/>
+                          <a:cs typeface="Courier New" panose="02070309020205020404" pitchFamily="49" charset="0"/>
+                        </a:rPr>
+                        <a:t>Q2[7]</a:t>
+                      </a:r>
+                    </a:p>
+                  </a:txBody>
+                  <a:tcPr/>
+                </a:tc>
+                <a:extLst>
+                  <a:ext uri="{0D108BD9-81ED-4DB2-BD59-A6C34878D82A}">
+                    <a16:rowId xmlns:a16="http://schemas.microsoft.com/office/drawing/2014/main" val="1353812191"/>
+                  </a:ext>
+                </a:extLst>
+              </a:tr>
+              <a:tr h="353778">
+                <a:tc>
+                  <a:txBody>
+                    <a:bodyPr/>
+                    <a:lstStyle/>
+                    <a:p>
+                      <a:pPr algn="ctr"/>
+                      <a:r>
+                        <a:rPr lang="en-US" sz="1600" b="1" dirty="0">
+                          <a:latin typeface="Courier New" panose="02070309020205020404" pitchFamily="49" charset="0"/>
+                          <a:cs typeface="Courier New" panose="02070309020205020404" pitchFamily="49" charset="0"/>
+                        </a:rPr>
+                        <a:t>↓</a:t>
+                      </a:r>
+                    </a:p>
+                  </a:txBody>
+                  <a:tcPr/>
+                </a:tc>
+                <a:tc>
+                  <a:txBody>
+                    <a:bodyPr/>
+                    <a:lstStyle/>
+                    <a:p>
+                      <a:pPr algn="ctr"/>
+                      <a:r>
+                        <a:rPr lang="en-US" sz="1600" b="1" dirty="0">
+                          <a:latin typeface="Courier New" panose="02070309020205020404" pitchFamily="49" charset="0"/>
+                          <a:cs typeface="Courier New" panose="02070309020205020404" pitchFamily="49" charset="0"/>
+                        </a:rPr>
+                        <a:t>↓</a:t>
+                      </a:r>
+                    </a:p>
+                  </a:txBody>
+                  <a:tcPr/>
+                </a:tc>
+                <a:tc>
+                  <a:txBody>
+                    <a:bodyPr/>
+                    <a:lstStyle/>
+                    <a:p>
+                      <a:pPr marL="0" marR="0" lvl="0" indent="0" algn="ctr" defTabSz="914400" rtl="0" eaLnBrk="1" fontAlgn="auto" latinLnBrk="0" hangingPunct="1">
+                        <a:lnSpc>
+                          <a:spcPct val="100000"/>
+                        </a:lnSpc>
+                        <a:spcBef>
+                          <a:spcPts val="0"/>
+                        </a:spcBef>
+                        <a:spcAft>
+                          <a:spcPts val="0"/>
+                        </a:spcAft>
+                        <a:buClrTx/>
+                        <a:buSzTx/>
+                        <a:buFontTx/>
+                        <a:buNone/>
+                        <a:tabLst/>
+                        <a:defRPr/>
+                      </a:pPr>
+                      <a:r>
+                        <a:rPr lang="en-US" sz="1600" b="1" dirty="0">
+                          <a:latin typeface="Courier New" panose="02070309020205020404" pitchFamily="49" charset="0"/>
+                          <a:cs typeface="Courier New" panose="02070309020205020404" pitchFamily="49" charset="0"/>
+                        </a:rPr>
+                        <a:t>↓</a:t>
+                      </a:r>
+                    </a:p>
+                  </a:txBody>
+                  <a:tcPr/>
+                </a:tc>
+                <a:tc>
+                  <a:txBody>
+                    <a:bodyPr/>
+                    <a:lstStyle/>
+                    <a:p>
+                      <a:pPr marL="0" marR="0" lvl="0" indent="0" algn="ctr" defTabSz="914400" rtl="0" eaLnBrk="1" fontAlgn="auto" latinLnBrk="0" hangingPunct="1">
+                        <a:lnSpc>
+                          <a:spcPct val="100000"/>
+                        </a:lnSpc>
+                        <a:spcBef>
+                          <a:spcPts val="0"/>
+                        </a:spcBef>
+                        <a:spcAft>
+                          <a:spcPts val="0"/>
+                        </a:spcAft>
+                        <a:buClrTx/>
+                        <a:buSzTx/>
+                        <a:buFontTx/>
+                        <a:buNone/>
+                        <a:tabLst/>
+                        <a:defRPr/>
+                      </a:pPr>
+                      <a:r>
+                        <a:rPr lang="en-US" sz="1600" b="1" dirty="0">
+                          <a:latin typeface="Courier New" panose="02070309020205020404" pitchFamily="49" charset="0"/>
+                          <a:cs typeface="Courier New" panose="02070309020205020404" pitchFamily="49" charset="0"/>
+                        </a:rPr>
+                        <a:t>↓</a:t>
+                      </a:r>
+                    </a:p>
+                  </a:txBody>
+                  <a:tcPr/>
+                </a:tc>
+                <a:tc>
+                  <a:txBody>
+                    <a:bodyPr/>
+                    <a:lstStyle/>
+                    <a:p>
+                      <a:pPr marL="0" marR="0" lvl="0" indent="0" algn="ctr" defTabSz="914400" rtl="0" eaLnBrk="1" fontAlgn="auto" latinLnBrk="0" hangingPunct="1">
+                        <a:lnSpc>
+                          <a:spcPct val="100000"/>
+                        </a:lnSpc>
+                        <a:spcBef>
+                          <a:spcPts val="0"/>
+                        </a:spcBef>
+                        <a:spcAft>
+                          <a:spcPts val="0"/>
+                        </a:spcAft>
+                        <a:buClrTx/>
+                        <a:buSzTx/>
+                        <a:buFontTx/>
+                        <a:buNone/>
+                        <a:tabLst/>
+                        <a:defRPr/>
+                      </a:pPr>
+                      <a:r>
+                        <a:rPr lang="en-US" sz="1600" b="1" dirty="0">
+                          <a:latin typeface="Courier New" panose="02070309020205020404" pitchFamily="49" charset="0"/>
+                          <a:cs typeface="Courier New" panose="02070309020205020404" pitchFamily="49" charset="0"/>
+                        </a:rPr>
+                        <a:t>↓</a:t>
+                      </a:r>
+                    </a:p>
+                  </a:txBody>
+                  <a:tcPr/>
+                </a:tc>
+                <a:tc>
+                  <a:txBody>
+                    <a:bodyPr/>
+                    <a:lstStyle/>
+                    <a:p>
+                      <a:pPr marL="0" marR="0" lvl="0" indent="0" algn="ctr" defTabSz="914400" rtl="0" eaLnBrk="1" fontAlgn="auto" latinLnBrk="0" hangingPunct="1">
+                        <a:lnSpc>
+                          <a:spcPct val="100000"/>
+                        </a:lnSpc>
+                        <a:spcBef>
+                          <a:spcPts val="0"/>
+                        </a:spcBef>
+                        <a:spcAft>
+                          <a:spcPts val="0"/>
+                        </a:spcAft>
+                        <a:buClrTx/>
+                        <a:buSzTx/>
+                        <a:buFontTx/>
+                        <a:buNone/>
+                        <a:tabLst/>
+                        <a:defRPr/>
+                      </a:pPr>
+                      <a:r>
+                        <a:rPr lang="en-US" sz="1600" b="1" dirty="0">
+                          <a:latin typeface="Courier New" panose="02070309020205020404" pitchFamily="49" charset="0"/>
+                          <a:cs typeface="Courier New" panose="02070309020205020404" pitchFamily="49" charset="0"/>
+                        </a:rPr>
+                        <a:t>↓</a:t>
+                      </a:r>
+                    </a:p>
+                  </a:txBody>
+                  <a:tcPr/>
+                </a:tc>
+                <a:tc>
+                  <a:txBody>
+                    <a:bodyPr/>
+                    <a:lstStyle/>
+                    <a:p>
+                      <a:pPr marL="0" marR="0" lvl="0" indent="0" algn="ctr" defTabSz="914400" rtl="0" eaLnBrk="1" fontAlgn="auto" latinLnBrk="0" hangingPunct="1">
+                        <a:lnSpc>
+                          <a:spcPct val="100000"/>
+                        </a:lnSpc>
+                        <a:spcBef>
+                          <a:spcPts val="0"/>
+                        </a:spcBef>
+                        <a:spcAft>
+                          <a:spcPts val="0"/>
+                        </a:spcAft>
+                        <a:buClrTx/>
+                        <a:buSzTx/>
+                        <a:buFontTx/>
+                        <a:buNone/>
+                        <a:tabLst/>
+                        <a:defRPr/>
+                      </a:pPr>
+                      <a:r>
+                        <a:rPr lang="en-US" sz="1600" b="1" dirty="0">
+                          <a:latin typeface="Courier New" panose="02070309020205020404" pitchFamily="49" charset="0"/>
+                          <a:cs typeface="Courier New" panose="02070309020205020404" pitchFamily="49" charset="0"/>
+                        </a:rPr>
+                        <a:t>↓</a:t>
+                      </a:r>
+                    </a:p>
+                  </a:txBody>
+                  <a:tcPr/>
+                </a:tc>
+                <a:tc>
+                  <a:txBody>
+                    <a:bodyPr/>
+                    <a:lstStyle/>
+                    <a:p>
+                      <a:pPr marL="0" marR="0" lvl="0" indent="0" algn="ctr" defTabSz="914400" rtl="0" eaLnBrk="1" fontAlgn="auto" latinLnBrk="0" hangingPunct="1">
+                        <a:lnSpc>
+                          <a:spcPct val="100000"/>
+                        </a:lnSpc>
+                        <a:spcBef>
+                          <a:spcPts val="0"/>
+                        </a:spcBef>
+                        <a:spcAft>
+                          <a:spcPts val="0"/>
+                        </a:spcAft>
+                        <a:buClrTx/>
+                        <a:buSzTx/>
+                        <a:buFontTx/>
+                        <a:buNone/>
+                        <a:tabLst/>
+                        <a:defRPr/>
+                      </a:pPr>
+                      <a:r>
+                        <a:rPr lang="en-US" sz="1600" b="1" dirty="0">
+                          <a:latin typeface="Courier New" panose="02070309020205020404" pitchFamily="49" charset="0"/>
+                          <a:cs typeface="Courier New" panose="02070309020205020404" pitchFamily="49" charset="0"/>
+                        </a:rPr>
+                        <a:t>↓</a:t>
+                      </a:r>
+                    </a:p>
+                  </a:txBody>
+                  <a:tcPr/>
+                </a:tc>
+                <a:extLst>
+                  <a:ext uri="{0D108BD9-81ED-4DB2-BD59-A6C34878D82A}">
+                    <a16:rowId xmlns:a16="http://schemas.microsoft.com/office/drawing/2014/main" val="3906466838"/>
+                  </a:ext>
+                </a:extLst>
+              </a:tr>
+              <a:tr h="353778">
+                <a:tc>
+                  <a:txBody>
+                    <a:bodyPr/>
+                    <a:lstStyle/>
+                    <a:p>
+                      <a:pPr algn="ctr"/>
+                      <a:r>
+                        <a:rPr lang="en-US" sz="1600" b="1" dirty="0">
+                          <a:latin typeface="Courier New" panose="02070309020205020404" pitchFamily="49" charset="0"/>
+                          <a:cs typeface="Courier New" panose="02070309020205020404" pitchFamily="49" charset="0"/>
+                        </a:rPr>
+                        <a:t>Q0[0]</a:t>
+                      </a:r>
+                    </a:p>
+                  </a:txBody>
+                  <a:tcPr/>
+                </a:tc>
+                <a:tc>
+                  <a:txBody>
+                    <a:bodyPr/>
+                    <a:lstStyle/>
+                    <a:p>
+                      <a:pPr algn="ctr"/>
+                      <a:r>
+                        <a:rPr lang="en-US" sz="1600" b="1" dirty="0">
+                          <a:latin typeface="Courier New" panose="02070309020205020404" pitchFamily="49" charset="0"/>
+                          <a:cs typeface="Courier New" panose="02070309020205020404" pitchFamily="49" charset="0"/>
+                        </a:rPr>
+                        <a:t>Q0[1]</a:t>
+                      </a:r>
+                    </a:p>
+                  </a:txBody>
+                  <a:tcPr/>
+                </a:tc>
+                <a:tc>
+                  <a:txBody>
+                    <a:bodyPr/>
+                    <a:lstStyle/>
+                    <a:p>
+                      <a:pPr algn="ctr"/>
+                      <a:r>
+                        <a:rPr lang="en-US" sz="1600" b="1" dirty="0">
+                          <a:latin typeface="Courier New" panose="02070309020205020404" pitchFamily="49" charset="0"/>
+                          <a:cs typeface="Courier New" panose="02070309020205020404" pitchFamily="49" charset="0"/>
+                        </a:rPr>
+                        <a:t>Q0[2]</a:t>
+                      </a:r>
+                    </a:p>
+                  </a:txBody>
+                  <a:tcPr/>
+                </a:tc>
+                <a:tc>
+                  <a:txBody>
+                    <a:bodyPr/>
+                    <a:lstStyle/>
+                    <a:p>
+                      <a:pPr algn="ctr"/>
+                      <a:r>
+                        <a:rPr lang="en-US" sz="1600" b="1" dirty="0">
+                          <a:latin typeface="Courier New" panose="02070309020205020404" pitchFamily="49" charset="0"/>
+                          <a:cs typeface="Courier New" panose="02070309020205020404" pitchFamily="49" charset="0"/>
+                        </a:rPr>
+                        <a:t>Q0[3]</a:t>
+                      </a:r>
+                    </a:p>
+                  </a:txBody>
+                  <a:tcPr/>
+                </a:tc>
+                <a:tc>
+                  <a:txBody>
+                    <a:bodyPr/>
+                    <a:lstStyle/>
+                    <a:p>
+                      <a:pPr algn="ctr"/>
+                      <a:r>
+                        <a:rPr lang="en-US" sz="1600" b="1" dirty="0">
+                          <a:latin typeface="Courier New" panose="02070309020205020404" pitchFamily="49" charset="0"/>
+                          <a:cs typeface="Courier New" panose="02070309020205020404" pitchFamily="49" charset="0"/>
+                        </a:rPr>
+                        <a:t>Q0[4]</a:t>
+                      </a:r>
+                    </a:p>
+                  </a:txBody>
+                  <a:tcPr/>
+                </a:tc>
+                <a:tc>
+                  <a:txBody>
+                    <a:bodyPr/>
+                    <a:lstStyle/>
+                    <a:p>
+                      <a:pPr algn="ctr"/>
+                      <a:r>
+                        <a:rPr lang="en-US" sz="1600" b="1" dirty="0">
+                          <a:latin typeface="Courier New" panose="02070309020205020404" pitchFamily="49" charset="0"/>
+                          <a:cs typeface="Courier New" panose="02070309020205020404" pitchFamily="49" charset="0"/>
+                        </a:rPr>
+                        <a:t>Q0[5]</a:t>
+                      </a:r>
+                    </a:p>
+                  </a:txBody>
+                  <a:tcPr/>
+                </a:tc>
+                <a:tc>
+                  <a:txBody>
+                    <a:bodyPr/>
+                    <a:lstStyle/>
+                    <a:p>
+                      <a:pPr algn="ctr"/>
+                      <a:r>
+                        <a:rPr lang="en-US" sz="1600" b="1" dirty="0">
+                          <a:latin typeface="Courier New" panose="02070309020205020404" pitchFamily="49" charset="0"/>
+                          <a:cs typeface="Courier New" panose="02070309020205020404" pitchFamily="49" charset="0"/>
+                        </a:rPr>
+                        <a:t>Q0[6]</a:t>
+                      </a:r>
+                    </a:p>
+                  </a:txBody>
+                  <a:tcPr/>
+                </a:tc>
+                <a:tc>
+                  <a:txBody>
+                    <a:bodyPr/>
+                    <a:lstStyle/>
+                    <a:p>
+                      <a:pPr algn="ctr"/>
+                      <a:r>
+                        <a:rPr lang="en-US" sz="1600" b="1" dirty="0">
+                          <a:latin typeface="Courier New" panose="02070309020205020404" pitchFamily="49" charset="0"/>
+                          <a:cs typeface="Courier New" panose="02070309020205020404" pitchFamily="49" charset="0"/>
+                        </a:rPr>
+                        <a:t>Q0[7]</a:t>
+                      </a:r>
+                    </a:p>
+                  </a:txBody>
+                  <a:tcPr/>
+                </a:tc>
+                <a:extLst>
+                  <a:ext uri="{0D108BD9-81ED-4DB2-BD59-A6C34878D82A}">
+                    <a16:rowId xmlns:a16="http://schemas.microsoft.com/office/drawing/2014/main" val="2955367424"/>
+                  </a:ext>
+                </a:extLst>
+              </a:tr>
+            </a:tbl>
+          </a:graphicData>
+        </a:graphic>
+      </p:graphicFrame>
     </p:spTree>
     <p:extLst>
       <p:ext uri="{BB962C8B-B14F-4D97-AF65-F5344CB8AC3E}">
-        <p14:creationId xmlns:p14="http://schemas.microsoft.com/office/powerpoint/2010/main" val="2398559693"/>
+        <p14:creationId xmlns:p14="http://schemas.microsoft.com/office/powerpoint/2010/main" val="631397661"/>
       </p:ext>
     </p:extLst>
   </p:cSld>

</xml_diff>